<commit_message>
Final updates before class
</commit_message>
<xml_diff>
--- a/companion-website/public/files/22. Is the New Testament Corrupted.pptx
+++ b/companion-website/public/files/22. Is the New Testament Corrupted.pptx
@@ -5,7 +5,7 @@
     <p:sldMasterId id="2147483648" r:id="rId1"/>
   </p:sldMasterIdLst>
   <p:notesMasterIdLst>
-    <p:notesMasterId r:id="rId42"/>
+    <p:notesMasterId r:id="rId41"/>
   </p:notesMasterIdLst>
   <p:sldIdLst>
     <p:sldId id="275" r:id="rId2"/>
@@ -27,27 +27,26 @@
     <p:sldId id="479" r:id="rId18"/>
     <p:sldId id="494" r:id="rId19"/>
     <p:sldId id="484" r:id="rId20"/>
-    <p:sldId id="493" r:id="rId21"/>
-    <p:sldId id="489" r:id="rId22"/>
-    <p:sldId id="463" r:id="rId23"/>
-    <p:sldId id="465" r:id="rId24"/>
-    <p:sldId id="464" r:id="rId25"/>
-    <p:sldId id="439" r:id="rId26"/>
-    <p:sldId id="438" r:id="rId27"/>
-    <p:sldId id="474" r:id="rId28"/>
-    <p:sldId id="449" r:id="rId29"/>
-    <p:sldId id="450" r:id="rId30"/>
-    <p:sldId id="448" r:id="rId31"/>
-    <p:sldId id="471" r:id="rId32"/>
-    <p:sldId id="261" r:id="rId33"/>
-    <p:sldId id="466" r:id="rId34"/>
-    <p:sldId id="467" r:id="rId35"/>
-    <p:sldId id="446" r:id="rId36"/>
-    <p:sldId id="456" r:id="rId37"/>
-    <p:sldId id="451" r:id="rId38"/>
-    <p:sldId id="454" r:id="rId39"/>
-    <p:sldId id="455" r:id="rId40"/>
-    <p:sldId id="473" r:id="rId41"/>
+    <p:sldId id="489" r:id="rId21"/>
+    <p:sldId id="463" r:id="rId22"/>
+    <p:sldId id="465" r:id="rId23"/>
+    <p:sldId id="464" r:id="rId24"/>
+    <p:sldId id="439" r:id="rId25"/>
+    <p:sldId id="438" r:id="rId26"/>
+    <p:sldId id="474" r:id="rId27"/>
+    <p:sldId id="449" r:id="rId28"/>
+    <p:sldId id="450" r:id="rId29"/>
+    <p:sldId id="448" r:id="rId30"/>
+    <p:sldId id="471" r:id="rId31"/>
+    <p:sldId id="261" r:id="rId32"/>
+    <p:sldId id="466" r:id="rId33"/>
+    <p:sldId id="467" r:id="rId34"/>
+    <p:sldId id="446" r:id="rId35"/>
+    <p:sldId id="456" r:id="rId36"/>
+    <p:sldId id="451" r:id="rId37"/>
+    <p:sldId id="454" r:id="rId38"/>
+    <p:sldId id="455" r:id="rId39"/>
+    <p:sldId id="473" r:id="rId40"/>
   </p:sldIdLst>
   <p:sldSz cx="9144000" cy="6858000" type="screen4x3"/>
   <p:notesSz cx="6858000" cy="9144000"/>
@@ -3516,7 +3515,7 @@
           <a:p>
             <a:fld id="{8F7EB338-8BB0-B64B-9F79-C87EA24D723F}" type="datetimeFigureOut">
               <a:rPr lang="en-US" smtClean="0"/>
-              <a:t>12/26/20</a:t>
+              <a:t>12/27/2020</a:t>
             </a:fld>
             <a:endParaRPr lang="en-US"/>
           </a:p>
@@ -4109,7 +4108,7 @@
     </p:spTree>
     <p:extLst>
       <p:ext uri="{BB962C8B-B14F-4D97-AF65-F5344CB8AC3E}">
-        <p14:creationId xmlns:p14="http://schemas.microsoft.com/office/powerpoint/2010/main" val="3238388308"/>
+        <p14:creationId xmlns:p14="http://schemas.microsoft.com/office/powerpoint/2010/main" val="166182347"/>
       </p:ext>
     </p:extLst>
   </p:cSld>
@@ -4184,7 +4183,7 @@
           <a:p>
             <a:fld id="{0A2C3B37-55FA-284F-9E83-751B4EA6E9B4}" type="slidenum">
               <a:rPr lang="en-US" smtClean="0"/>
-              <a:t>21</a:t>
+              <a:t>37</a:t>
             </a:fld>
             <a:endParaRPr lang="en-US"/>
           </a:p>
@@ -4193,7 +4192,7 @@
     </p:spTree>
     <p:extLst>
       <p:ext uri="{BB962C8B-B14F-4D97-AF65-F5344CB8AC3E}">
-        <p14:creationId xmlns:p14="http://schemas.microsoft.com/office/powerpoint/2010/main" val="166182347"/>
+        <p14:creationId xmlns:p14="http://schemas.microsoft.com/office/powerpoint/2010/main" val="1212251316"/>
       </p:ext>
     </p:extLst>
   </p:cSld>
@@ -4277,7 +4276,7 @@
     </p:spTree>
     <p:extLst>
       <p:ext uri="{BB962C8B-B14F-4D97-AF65-F5344CB8AC3E}">
-        <p14:creationId xmlns:p14="http://schemas.microsoft.com/office/powerpoint/2010/main" val="1212251316"/>
+        <p14:creationId xmlns:p14="http://schemas.microsoft.com/office/powerpoint/2010/main" val="4021696528"/>
       </p:ext>
     </p:extLst>
   </p:cSld>
@@ -4353,90 +4352,6 @@
             <a:fld id="{0A2C3B37-55FA-284F-9E83-751B4EA6E9B4}" type="slidenum">
               <a:rPr lang="en-US" smtClean="0"/>
               <a:t>39</a:t>
-            </a:fld>
-            <a:endParaRPr lang="en-US"/>
-          </a:p>
-        </p:txBody>
-      </p:sp>
-    </p:spTree>
-    <p:extLst>
-      <p:ext uri="{BB962C8B-B14F-4D97-AF65-F5344CB8AC3E}">
-        <p14:creationId xmlns:p14="http://schemas.microsoft.com/office/powerpoint/2010/main" val="4021696528"/>
-      </p:ext>
-    </p:extLst>
-  </p:cSld>
-  <p:clrMapOvr>
-    <a:masterClrMapping/>
-  </p:clrMapOvr>
-</p:notes>
-</file>
-
-<file path=ppt/notesSlides/notesSlide16.xml><?xml version="1.0" encoding="utf-8"?>
-<p:notes xmlns:a="http://schemas.openxmlformats.org/drawingml/2006/main" xmlns:r="http://schemas.openxmlformats.org/officeDocument/2006/relationships" xmlns:p="http://schemas.openxmlformats.org/presentationml/2006/main">
-  <p:cSld>
-    <p:spTree>
-      <p:nvGrpSpPr>
-        <p:cNvPr id="1" name=""/>
-        <p:cNvGrpSpPr/>
-        <p:nvPr/>
-      </p:nvGrpSpPr>
-      <p:grpSpPr>
-        <a:xfrm>
-          <a:off x="0" y="0"/>
-          <a:ext cx="0" cy="0"/>
-          <a:chOff x="0" y="0"/>
-          <a:chExt cx="0" cy="0"/>
-        </a:xfrm>
-      </p:grpSpPr>
-      <p:sp>
-        <p:nvSpPr>
-          <p:cNvPr id="2" name="Slide Image Placeholder 1"/>
-          <p:cNvSpPr>
-            <a:spLocks noGrp="1" noRot="1" noChangeAspect="1"/>
-          </p:cNvSpPr>
-          <p:nvPr>
-            <p:ph type="sldImg"/>
-          </p:nvPr>
-        </p:nvSpPr>
-        <p:spPr/>
-      </p:sp>
-      <p:sp>
-        <p:nvSpPr>
-          <p:cNvPr id="3" name="Notes Placeholder 2"/>
-          <p:cNvSpPr>
-            <a:spLocks noGrp="1"/>
-          </p:cNvSpPr>
-          <p:nvPr>
-            <p:ph type="body" idx="1"/>
-          </p:nvPr>
-        </p:nvSpPr>
-        <p:spPr/>
-        <p:txBody>
-          <a:bodyPr/>
-          <a:lstStyle/>
-          <a:p>
-            <a:endParaRPr lang="en-US" dirty="0"/>
-          </a:p>
-        </p:txBody>
-      </p:sp>
-      <p:sp>
-        <p:nvSpPr>
-          <p:cNvPr id="4" name="Slide Number Placeholder 3"/>
-          <p:cNvSpPr>
-            <a:spLocks noGrp="1"/>
-          </p:cNvSpPr>
-          <p:nvPr>
-            <p:ph type="sldNum" sz="quarter" idx="10"/>
-          </p:nvPr>
-        </p:nvSpPr>
-        <p:spPr/>
-        <p:txBody>
-          <a:bodyPr/>
-          <a:lstStyle/>
-          <a:p>
-            <a:fld id="{0A2C3B37-55FA-284F-9E83-751B4EA6E9B4}" type="slidenum">
-              <a:rPr lang="en-US" smtClean="0"/>
-              <a:t>40</a:t>
             </a:fld>
             <a:endParaRPr lang="en-US"/>
           </a:p>
@@ -5311,7 +5226,7 @@
             <a:fld id="{DBE77699-C466-4996-ADED-71C8160E04A2}" type="datetimeFigureOut">
               <a:rPr lang="en-US" smtClean="0"/>
               <a:pPr/>
-              <a:t>12/26/20</a:t>
+              <a:t>12/27/2020</a:t>
             </a:fld>
             <a:endParaRPr lang="en-US"/>
           </a:p>
@@ -5476,7 +5391,7 @@
             <a:fld id="{DBE77699-C466-4996-ADED-71C8160E04A2}" type="datetimeFigureOut">
               <a:rPr lang="en-US" smtClean="0"/>
               <a:pPr/>
-              <a:t>12/26/20</a:t>
+              <a:t>12/27/2020</a:t>
             </a:fld>
             <a:endParaRPr lang="en-US"/>
           </a:p>
@@ -5651,7 +5566,7 @@
             <a:fld id="{DBE77699-C466-4996-ADED-71C8160E04A2}" type="datetimeFigureOut">
               <a:rPr lang="en-US" smtClean="0"/>
               <a:pPr/>
-              <a:t>12/26/20</a:t>
+              <a:t>12/27/2020</a:t>
             </a:fld>
             <a:endParaRPr lang="en-US"/>
           </a:p>
@@ -5830,7 +5745,7 @@
             <a:fld id="{DBE77699-C466-4996-ADED-71C8160E04A2}" type="datetimeFigureOut">
               <a:rPr lang="en-US" smtClean="0"/>
               <a:pPr/>
-              <a:t>12/26/20</a:t>
+              <a:t>12/27/2020</a:t>
             </a:fld>
             <a:endParaRPr lang="en-US"/>
           </a:p>
@@ -5993,7 +5908,7 @@
             <a:fld id="{DBE77699-C466-4996-ADED-71C8160E04A2}" type="datetimeFigureOut">
               <a:rPr lang="en-US" smtClean="0"/>
               <a:pPr/>
-              <a:t>12/26/20</a:t>
+              <a:t>12/27/2020</a:t>
             </a:fld>
             <a:endParaRPr lang="en-US"/>
           </a:p>
@@ -6401,7 +6316,7 @@
             <a:fld id="{DBE77699-C466-4996-ADED-71C8160E04A2}" type="datetimeFigureOut">
               <a:rPr lang="en-US" smtClean="0"/>
               <a:pPr/>
-              <a:t>12/26/20</a:t>
+              <a:t>12/27/2020</a:t>
             </a:fld>
             <a:endParaRPr lang="en-US"/>
           </a:p>
@@ -6643,7 +6558,7 @@
             <a:fld id="{DBE77699-C466-4996-ADED-71C8160E04A2}" type="datetimeFigureOut">
               <a:rPr lang="en-US" smtClean="0"/>
               <a:pPr/>
-              <a:t>12/26/20</a:t>
+              <a:t>12/27/2020</a:t>
             </a:fld>
             <a:endParaRPr lang="en-US"/>
           </a:p>
@@ -6925,7 +6840,7 @@
             <a:fld id="{DBE77699-C466-4996-ADED-71C8160E04A2}" type="datetimeFigureOut">
               <a:rPr lang="en-US" smtClean="0"/>
               <a:pPr/>
-              <a:t>12/26/20</a:t>
+              <a:t>12/27/2020</a:t>
             </a:fld>
             <a:endParaRPr lang="en-US"/>
           </a:p>
@@ -7341,7 +7256,7 @@
             <a:fld id="{DBE77699-C466-4996-ADED-71C8160E04A2}" type="datetimeFigureOut">
               <a:rPr lang="en-US" smtClean="0"/>
               <a:pPr/>
-              <a:t>12/26/20</a:t>
+              <a:t>12/27/2020</a:t>
             </a:fld>
             <a:endParaRPr lang="en-US"/>
           </a:p>
@@ -7455,7 +7370,7 @@
             <a:fld id="{DBE77699-C466-4996-ADED-71C8160E04A2}" type="datetimeFigureOut">
               <a:rPr lang="en-US" smtClean="0"/>
               <a:pPr/>
-              <a:t>12/26/20</a:t>
+              <a:t>12/27/2020</a:t>
             </a:fld>
             <a:endParaRPr lang="en-US"/>
           </a:p>
@@ -7547,7 +7462,7 @@
             <a:fld id="{DBE77699-C466-4996-ADED-71C8160E04A2}" type="datetimeFigureOut">
               <a:rPr lang="en-US" smtClean="0"/>
               <a:pPr/>
-              <a:t>12/26/20</a:t>
+              <a:t>12/27/2020</a:t>
             </a:fld>
             <a:endParaRPr lang="en-US"/>
           </a:p>
@@ -7819,7 +7734,7 @@
             <a:fld id="{DBE77699-C466-4996-ADED-71C8160E04A2}" type="datetimeFigureOut">
               <a:rPr lang="en-US" smtClean="0"/>
               <a:pPr/>
-              <a:t>12/26/20</a:t>
+              <a:t>12/27/2020</a:t>
             </a:fld>
             <a:endParaRPr lang="en-US"/>
           </a:p>
@@ -8068,7 +7983,7 @@
             <a:fld id="{DBE77699-C466-4996-ADED-71C8160E04A2}" type="datetimeFigureOut">
               <a:rPr lang="en-US" smtClean="0"/>
               <a:pPr/>
-              <a:t>12/26/20</a:t>
+              <a:t>12/27/2020</a:t>
             </a:fld>
             <a:endParaRPr lang="en-US"/>
           </a:p>
@@ -8279,7 +8194,7 @@
             <a:fld id="{DBE77699-C466-4996-ADED-71C8160E04A2}" type="datetimeFigureOut">
               <a:rPr lang="en-US" smtClean="0"/>
               <a:pPr/>
-              <a:t>12/26/20</a:t>
+              <a:t>12/27/2020</a:t>
             </a:fld>
             <a:endParaRPr lang="en-US"/>
           </a:p>
@@ -17407,554 +17322,6 @@
                     <a:schemeClr val="tx1"/>
                   </a:solidFill>
                 </a:rPr>
-                <a:t>3</a:t>
-              </a:r>
-            </a:p>
-          </p:txBody>
-        </p:sp>
-        <p:sp>
-          <p:nvSpPr>
-            <p:cNvPr id="10" name="Rectangle 9">
-              <a:extLst>
-                <a:ext uri="{FF2B5EF4-FFF2-40B4-BE49-F238E27FC236}">
-                  <a16:creationId xmlns:a16="http://schemas.microsoft.com/office/drawing/2014/main" id="{312C2DC5-5653-DC4B-98A2-76A0B8F08883}"/>
-                </a:ext>
-              </a:extLst>
-            </p:cNvPr>
-            <p:cNvSpPr/>
-            <p:nvPr/>
-          </p:nvSpPr>
-          <p:spPr>
-            <a:xfrm>
-              <a:off x="1447800" y="1833265"/>
-              <a:ext cx="7086600" cy="685800"/>
-            </a:xfrm>
-            <a:prstGeom prst="rect">
-              <a:avLst/>
-            </a:prstGeom>
-            <a:noFill/>
-            <a:ln>
-              <a:noFill/>
-            </a:ln>
-          </p:spPr>
-          <p:style>
-            <a:lnRef idx="2">
-              <a:schemeClr val="accent1">
-                <a:shade val="50000"/>
-              </a:schemeClr>
-            </a:lnRef>
-            <a:fillRef idx="1">
-              <a:schemeClr val="accent1"/>
-            </a:fillRef>
-            <a:effectRef idx="0">
-              <a:schemeClr val="accent1"/>
-            </a:effectRef>
-            <a:fontRef idx="minor">
-              <a:schemeClr val="lt1"/>
-            </a:fontRef>
-          </p:style>
-          <p:txBody>
-            <a:bodyPr rtlCol="0" anchor="ctr"/>
-            <a:lstStyle/>
-            <a:p>
-              <a:r>
-                <a:rPr lang="en-US" sz="2400" dirty="0">
-                  <a:solidFill>
-                    <a:schemeClr val="tx1"/>
-                  </a:solidFill>
-                </a:rPr>
-                <a:t>New Testament documents are </a:t>
-              </a:r>
-              <a:r>
-                <a:rPr lang="en-US" sz="2400" b="1" dirty="0">
-                  <a:solidFill>
-                    <a:schemeClr val="tx1"/>
-                  </a:solidFill>
-                  <a:highlight>
-                    <a:srgbClr val="C00002"/>
-                  </a:highlight>
-                </a:rPr>
-                <a:t>better attested that other ancient documents</a:t>
-              </a:r>
-            </a:p>
-          </p:txBody>
-        </p:sp>
-      </p:grpSp>
-      <p:cxnSp>
-        <p:nvCxnSpPr>
-          <p:cNvPr id="8" name="Straight Connector 7">
-            <a:extLst>
-              <a:ext uri="{FF2B5EF4-FFF2-40B4-BE49-F238E27FC236}">
-                <a16:creationId xmlns:a16="http://schemas.microsoft.com/office/drawing/2014/main" id="{B1CE1C68-C736-2F42-AD3D-29FCB9A69CAD}"/>
-              </a:ext>
-            </a:extLst>
-          </p:cNvPr>
-          <p:cNvCxnSpPr>
-            <a:cxnSpLocks/>
-          </p:cNvCxnSpPr>
-          <p:nvPr/>
-        </p:nvCxnSpPr>
-        <p:spPr>
-          <a:xfrm>
-            <a:off x="228600" y="1066800"/>
-            <a:ext cx="2209800" cy="0"/>
-          </a:xfrm>
-          <a:prstGeom prst="line">
-            <a:avLst/>
-          </a:prstGeom>
-          <a:ln w="76200">
-            <a:solidFill>
-              <a:srgbClr val="009EC0"/>
-            </a:solidFill>
-          </a:ln>
-        </p:spPr>
-        <p:style>
-          <a:lnRef idx="1">
-            <a:schemeClr val="dk1"/>
-          </a:lnRef>
-          <a:fillRef idx="0">
-            <a:schemeClr val="dk1"/>
-          </a:fillRef>
-          <a:effectRef idx="0">
-            <a:schemeClr val="dk1"/>
-          </a:effectRef>
-          <a:fontRef idx="minor">
-            <a:schemeClr val="tx1"/>
-          </a:fontRef>
-        </p:style>
-      </p:cxnSp>
-      <p:graphicFrame>
-        <p:nvGraphicFramePr>
-          <p:cNvPr id="23" name="Table 22">
-            <a:extLst>
-              <a:ext uri="{FF2B5EF4-FFF2-40B4-BE49-F238E27FC236}">
-                <a16:creationId xmlns:a16="http://schemas.microsoft.com/office/drawing/2014/main" id="{257C2C58-F372-4E6B-8761-EBADAB91DFC8}"/>
-              </a:ext>
-            </a:extLst>
-          </p:cNvPr>
-          <p:cNvGraphicFramePr>
-            <a:graphicFrameLocks noGrp="1"/>
-          </p:cNvGraphicFramePr>
-          <p:nvPr/>
-        </p:nvGraphicFramePr>
-        <p:xfrm>
-          <a:off x="1600200" y="2743200"/>
-          <a:ext cx="7162800" cy="1188720"/>
-        </p:xfrm>
-        <a:graphic>
-          <a:graphicData uri="http://schemas.openxmlformats.org/drawingml/2006/table">
-            <a:tbl>
-              <a:tblPr firstRow="1" bandRow="1">
-                <a:tableStyleId>{2D5ABB26-0587-4C30-8999-92F81FD0307C}</a:tableStyleId>
-              </a:tblPr>
-              <a:tblGrid>
-                <a:gridCol w="7162800">
-                  <a:extLst>
-                    <a:ext uri="{9D8B030D-6E8A-4147-A177-3AD203B41FA5}">
-                      <a16:colId xmlns:a16="http://schemas.microsoft.com/office/drawing/2014/main" val="1107341750"/>
-                    </a:ext>
-                  </a:extLst>
-                </a:gridCol>
-              </a:tblGrid>
-              <a:tr h="370840">
-                <a:tc>
-                  <a:txBody>
-                    <a:bodyPr/>
-                    <a:lstStyle/>
-                    <a:p>
-                      <a:r>
-                        <a:rPr lang="en-US" sz="2400" b="0" dirty="0"/>
-                        <a:t>New Testament manuscripts are:</a:t>
-                      </a:r>
-                    </a:p>
-                    <a:p>
-                      <a:pPr marL="457200" indent="-457200">
-                        <a:buAutoNum type="arabicPeriod"/>
-                      </a:pPr>
-                      <a:r>
-                        <a:rPr lang="en-US" sz="2400" b="0" dirty="0"/>
-                        <a:t>Earlier</a:t>
-                      </a:r>
-                    </a:p>
-                    <a:p>
-                      <a:pPr marL="457200" indent="-457200">
-                        <a:buAutoNum type="arabicPeriod"/>
-                      </a:pPr>
-                      <a:r>
-                        <a:rPr lang="en-US" sz="2400" b="0" dirty="0"/>
-                        <a:t>More numerous</a:t>
-                      </a:r>
-                    </a:p>
-                  </a:txBody>
-                  <a:tcPr marL="182880">
-                    <a:lnL w="57150" cap="flat" cmpd="sng" algn="ctr">
-                      <a:solidFill>
-                        <a:schemeClr val="bg1">
-                          <a:lumMod val="75000"/>
-                          <a:lumOff val="25000"/>
-                        </a:schemeClr>
-                      </a:solidFill>
-                      <a:prstDash val="solid"/>
-                      <a:round/>
-                      <a:headEnd type="none" w="med" len="med"/>
-                      <a:tailEnd type="none" w="med" len="med"/>
-                    </a:lnL>
-                    <a:lnR>
-                      <a:noFill/>
-                    </a:lnR>
-                    <a:lnT>
-                      <a:noFill/>
-                    </a:lnT>
-                    <a:lnB>
-                      <a:noFill/>
-                    </a:lnB>
-                    <a:lnTlToBr w="12700" cmpd="sng">
-                      <a:noFill/>
-                      <a:prstDash val="solid"/>
-                    </a:lnTlToBr>
-                    <a:lnBlToTr w="12700" cmpd="sng">
-                      <a:noFill/>
-                      <a:prstDash val="solid"/>
-                    </a:lnBlToTr>
-                  </a:tcPr>
-                </a:tc>
-                <a:extLst>
-                  <a:ext uri="{0D108BD9-81ED-4DB2-BD59-A6C34878D82A}">
-                    <a16:rowId xmlns:a16="http://schemas.microsoft.com/office/drawing/2014/main" val="1984863204"/>
-                  </a:ext>
-                </a:extLst>
-              </a:tr>
-            </a:tbl>
-          </a:graphicData>
-        </a:graphic>
-      </p:graphicFrame>
-    </p:spTree>
-    <p:extLst>
-      <p:ext uri="{BB962C8B-B14F-4D97-AF65-F5344CB8AC3E}">
-        <p14:creationId xmlns:p14="http://schemas.microsoft.com/office/powerpoint/2010/main" val="2830065106"/>
-      </p:ext>
-    </p:extLst>
-  </p:cSld>
-  <p:clrMapOvr>
-    <a:masterClrMapping/>
-  </p:clrMapOvr>
-  <p:timing>
-    <p:tnLst>
-      <p:par>
-        <p:cTn id="1" dur="indefinite" restart="never" nodeType="tmRoot">
-          <p:childTnLst>
-            <p:seq concurrent="1" nextAc="seek">
-              <p:cTn id="2" dur="indefinite" nodeType="mainSeq">
-                <p:childTnLst>
-                  <p:par>
-                    <p:cTn id="3" fill="hold">
-                      <p:stCondLst>
-                        <p:cond delay="indefinite"/>
-                        <p:cond evt="onBegin" delay="0">
-                          <p:tn val="2"/>
-                        </p:cond>
-                      </p:stCondLst>
-                      <p:childTnLst>
-                        <p:par>
-                          <p:cTn id="4" fill="hold">
-                            <p:stCondLst>
-                              <p:cond delay="0"/>
-                            </p:stCondLst>
-                            <p:childTnLst>
-                              <p:par>
-                                <p:cTn id="5" presetID="10" presetClass="entr" presetSubtype="0" fill="hold" grpId="0" nodeType="withEffect">
-                                  <p:stCondLst>
-                                    <p:cond delay="0"/>
-                                  </p:stCondLst>
-                                  <p:childTnLst>
-                                    <p:set>
-                                      <p:cBhvr>
-                                        <p:cTn id="6" dur="1" fill="hold">
-                                          <p:stCondLst>
-                                            <p:cond delay="0"/>
-                                          </p:stCondLst>
-                                        </p:cTn>
-                                        <p:tgtEl>
-                                          <p:spTgt spid="6"/>
-                                        </p:tgtEl>
-                                        <p:attrNameLst>
-                                          <p:attrName>style.visibility</p:attrName>
-                                        </p:attrNameLst>
-                                      </p:cBhvr>
-                                      <p:to>
-                                        <p:strVal val="visible"/>
-                                      </p:to>
-                                    </p:set>
-                                    <p:animEffect transition="in" filter="fade">
-                                      <p:cBhvr>
-                                        <p:cTn id="7" dur="250"/>
-                                        <p:tgtEl>
-                                          <p:spTgt spid="6"/>
-                                        </p:tgtEl>
-                                      </p:cBhvr>
-                                    </p:animEffect>
-                                  </p:childTnLst>
-                                </p:cTn>
-                              </p:par>
-                              <p:par>
-                                <p:cTn id="8" presetID="10" presetClass="entr" presetSubtype="0" fill="hold" nodeType="withEffect">
-                                  <p:stCondLst>
-                                    <p:cond delay="0"/>
-                                  </p:stCondLst>
-                                  <p:childTnLst>
-                                    <p:set>
-                                      <p:cBhvr>
-                                        <p:cTn id="9" dur="1" fill="hold">
-                                          <p:stCondLst>
-                                            <p:cond delay="0"/>
-                                          </p:stCondLst>
-                                        </p:cTn>
-                                        <p:tgtEl>
-                                          <p:spTgt spid="8"/>
-                                        </p:tgtEl>
-                                        <p:attrNameLst>
-                                          <p:attrName>style.visibility</p:attrName>
-                                        </p:attrNameLst>
-                                      </p:cBhvr>
-                                      <p:to>
-                                        <p:strVal val="visible"/>
-                                      </p:to>
-                                    </p:set>
-                                    <p:animEffect transition="in" filter="fade">
-                                      <p:cBhvr>
-                                        <p:cTn id="10" dur="250"/>
-                                        <p:tgtEl>
-                                          <p:spTgt spid="8"/>
-                                        </p:tgtEl>
-                                      </p:cBhvr>
-                                    </p:animEffect>
-                                  </p:childTnLst>
-                                </p:cTn>
-                              </p:par>
-                              <p:par>
-                                <p:cTn id="11" presetID="10" presetClass="entr" presetSubtype="0" fill="hold" nodeType="withEffect">
-                                  <p:stCondLst>
-                                    <p:cond delay="0"/>
-                                  </p:stCondLst>
-                                  <p:childTnLst>
-                                    <p:set>
-                                      <p:cBhvr>
-                                        <p:cTn id="12" dur="1" fill="hold">
-                                          <p:stCondLst>
-                                            <p:cond delay="0"/>
-                                          </p:stCondLst>
-                                        </p:cTn>
-                                        <p:tgtEl>
-                                          <p:spTgt spid="9"/>
-                                        </p:tgtEl>
-                                        <p:attrNameLst>
-                                          <p:attrName>style.visibility</p:attrName>
-                                        </p:attrNameLst>
-                                      </p:cBhvr>
-                                      <p:to>
-                                        <p:strVal val="visible"/>
-                                      </p:to>
-                                    </p:set>
-                                    <p:animEffect transition="in" filter="fade">
-                                      <p:cBhvr>
-                                        <p:cTn id="13" dur="250"/>
-                                        <p:tgtEl>
-                                          <p:spTgt spid="9"/>
-                                        </p:tgtEl>
-                                      </p:cBhvr>
-                                    </p:animEffect>
-                                  </p:childTnLst>
-                                </p:cTn>
-                              </p:par>
-                              <p:par>
-                                <p:cTn id="14" presetID="10" presetClass="entr" presetSubtype="0" fill="hold" nodeType="withEffect">
-                                  <p:stCondLst>
-                                    <p:cond delay="0"/>
-                                  </p:stCondLst>
-                                  <p:childTnLst>
-                                    <p:set>
-                                      <p:cBhvr>
-                                        <p:cTn id="15" dur="1" fill="hold">
-                                          <p:stCondLst>
-                                            <p:cond delay="0"/>
-                                          </p:stCondLst>
-                                        </p:cTn>
-                                        <p:tgtEl>
-                                          <p:spTgt spid="23"/>
-                                        </p:tgtEl>
-                                        <p:attrNameLst>
-                                          <p:attrName>style.visibility</p:attrName>
-                                        </p:attrNameLst>
-                                      </p:cBhvr>
-                                      <p:to>
-                                        <p:strVal val="visible"/>
-                                      </p:to>
-                                    </p:set>
-                                    <p:animEffect transition="in" filter="fade">
-                                      <p:cBhvr>
-                                        <p:cTn id="16" dur="250"/>
-                                        <p:tgtEl>
-                                          <p:spTgt spid="23"/>
-                                        </p:tgtEl>
-                                      </p:cBhvr>
-                                    </p:animEffect>
-                                  </p:childTnLst>
-                                </p:cTn>
-                              </p:par>
-                            </p:childTnLst>
-                          </p:cTn>
-                        </p:par>
-                      </p:childTnLst>
-                    </p:cTn>
-                  </p:par>
-                </p:childTnLst>
-              </p:cTn>
-              <p:prevCondLst>
-                <p:cond evt="onPrev" delay="0">
-                  <p:tgtEl>
-                    <p:sldTgt/>
-                  </p:tgtEl>
-                </p:cond>
-              </p:prevCondLst>
-              <p:nextCondLst>
-                <p:cond evt="onNext" delay="0">
-                  <p:tgtEl>
-                    <p:sldTgt/>
-                  </p:tgtEl>
-                </p:cond>
-              </p:nextCondLst>
-            </p:seq>
-          </p:childTnLst>
-        </p:cTn>
-      </p:par>
-    </p:tnLst>
-    <p:bldLst>
-      <p:bldP spid="6" grpId="0"/>
-    </p:bldLst>
-  </p:timing>
-</p:sld>
-</file>
-
-<file path=ppt/slides/slide21.xml><?xml version="1.0" encoding="utf-8"?>
-<p:sld xmlns:a="http://schemas.openxmlformats.org/drawingml/2006/main" xmlns:r="http://schemas.openxmlformats.org/officeDocument/2006/relationships" xmlns:p="http://schemas.openxmlformats.org/presentationml/2006/main">
-  <p:cSld>
-    <p:spTree>
-      <p:nvGrpSpPr>
-        <p:cNvPr id="1" name=""/>
-        <p:cNvGrpSpPr/>
-        <p:nvPr/>
-      </p:nvGrpSpPr>
-      <p:grpSpPr>
-        <a:xfrm>
-          <a:off x="0" y="0"/>
-          <a:ext cx="0" cy="0"/>
-          <a:chOff x="0" y="0"/>
-          <a:chExt cx="0" cy="0"/>
-        </a:xfrm>
-      </p:grpSpPr>
-      <p:sp>
-        <p:nvSpPr>
-          <p:cNvPr id="6" name="TextBox 5"/>
-          <p:cNvSpPr txBox="1"/>
-          <p:nvPr/>
-        </p:nvSpPr>
-        <p:spPr>
-          <a:xfrm>
-            <a:off x="228600" y="152400"/>
-            <a:ext cx="8610600" cy="677108"/>
-          </a:xfrm>
-          <a:prstGeom prst="rect">
-            <a:avLst/>
-          </a:prstGeom>
-          <a:noFill/>
-        </p:spPr>
-        <p:txBody>
-          <a:bodyPr wrap="square" rtlCol="0">
-            <a:spAutoFit/>
-          </a:bodyPr>
-          <a:lstStyle/>
-          <a:p>
-            <a:r>
-              <a:rPr lang="en-US" sz="3800" b="1" dirty="0"/>
-              <a:t>Can we trust the manuscripts?</a:t>
-            </a:r>
-          </a:p>
-        </p:txBody>
-      </p:sp>
-      <p:grpSp>
-        <p:nvGrpSpPr>
-          <p:cNvPr id="9" name="Group 8">
-            <a:extLst>
-              <a:ext uri="{FF2B5EF4-FFF2-40B4-BE49-F238E27FC236}">
-                <a16:creationId xmlns:a16="http://schemas.microsoft.com/office/drawing/2014/main" id="{55676BE1-B42E-AD44-9DD5-FF20BEB47F36}"/>
-              </a:ext>
-            </a:extLst>
-          </p:cNvPr>
-          <p:cNvGrpSpPr/>
-          <p:nvPr/>
-        </p:nvGrpSpPr>
-        <p:grpSpPr>
-          <a:xfrm>
-            <a:off x="533400" y="1694260"/>
-            <a:ext cx="8001000" cy="685800"/>
-            <a:chOff x="533400" y="1833265"/>
-            <a:chExt cx="8001000" cy="685800"/>
-          </a:xfrm>
-        </p:grpSpPr>
-        <p:sp>
-          <p:nvSpPr>
-            <p:cNvPr id="2" name="Oval 1">
-              <a:extLst>
-                <a:ext uri="{FF2B5EF4-FFF2-40B4-BE49-F238E27FC236}">
-                  <a16:creationId xmlns:a16="http://schemas.microsoft.com/office/drawing/2014/main" id="{876D5A54-0C8D-804B-88A0-6609A2C1405C}"/>
-                </a:ext>
-              </a:extLst>
-            </p:cNvPr>
-            <p:cNvSpPr/>
-            <p:nvPr/>
-          </p:nvSpPr>
-          <p:spPr>
-            <a:xfrm>
-              <a:off x="533400" y="1833265"/>
-              <a:ext cx="685800" cy="685800"/>
-            </a:xfrm>
-            <a:prstGeom prst="ellipse">
-              <a:avLst/>
-            </a:prstGeom>
-            <a:solidFill>
-              <a:srgbClr val="009EC0"/>
-            </a:solidFill>
-            <a:ln>
-              <a:noFill/>
-            </a:ln>
-          </p:spPr>
-          <p:style>
-            <a:lnRef idx="2">
-              <a:schemeClr val="accent1">
-                <a:shade val="50000"/>
-              </a:schemeClr>
-            </a:lnRef>
-            <a:fillRef idx="1">
-              <a:schemeClr val="accent1"/>
-            </a:fillRef>
-            <a:effectRef idx="0">
-              <a:schemeClr val="accent1"/>
-            </a:effectRef>
-            <a:fontRef idx="minor">
-              <a:schemeClr val="lt1"/>
-            </a:fontRef>
-          </p:style>
-          <p:txBody>
-            <a:bodyPr rtlCol="0" anchor="ctr"/>
-            <a:lstStyle/>
-            <a:p>
-              <a:pPr algn="ctr"/>
-              <a:r>
-                <a:rPr lang="en-US" sz="2800" dirty="0">
-                  <a:solidFill>
-                    <a:schemeClr val="tx1"/>
-                  </a:solidFill>
-                </a:rPr>
                 <a:t>4</a:t>
               </a:r>
             </a:p>
@@ -18307,7 +17674,7 @@
 </p:sld>
 </file>
 
-<file path=ppt/slides/slide22.xml><?xml version="1.0" encoding="utf-8"?>
+<file path=ppt/slides/slide21.xml><?xml version="1.0" encoding="utf-8"?>
 <p:sld xmlns:a="http://schemas.openxmlformats.org/drawingml/2006/main" xmlns:r="http://schemas.openxmlformats.org/officeDocument/2006/relationships" xmlns:p="http://schemas.openxmlformats.org/presentationml/2006/main">
   <p:cSld>
     <p:spTree>
@@ -18593,6 +17960,151 @@
 </p:sld>
 </file>
 
+<file path=ppt/slides/slide22.xml><?xml version="1.0" encoding="utf-8"?>
+<p:sld xmlns:a="http://schemas.openxmlformats.org/drawingml/2006/main" xmlns:r="http://schemas.openxmlformats.org/officeDocument/2006/relationships" xmlns:p="http://schemas.openxmlformats.org/presentationml/2006/main">
+  <p:cSld>
+    <p:spTree>
+      <p:nvGrpSpPr>
+        <p:cNvPr id="1" name=""/>
+        <p:cNvGrpSpPr/>
+        <p:nvPr/>
+      </p:nvGrpSpPr>
+      <p:grpSpPr>
+        <a:xfrm>
+          <a:off x="0" y="0"/>
+          <a:ext cx="0" cy="0"/>
+          <a:chOff x="0" y="0"/>
+          <a:chExt cx="0" cy="0"/>
+        </a:xfrm>
+      </p:grpSpPr>
+      <p:sp>
+        <p:nvSpPr>
+          <p:cNvPr id="2" name="Title 1">
+            <a:extLst>
+              <a:ext uri="{FF2B5EF4-FFF2-40B4-BE49-F238E27FC236}">
+                <a16:creationId xmlns:a16="http://schemas.microsoft.com/office/drawing/2014/main" id="{C8F392D1-A4F5-744A-9239-99BC6612F901}"/>
+              </a:ext>
+            </a:extLst>
+          </p:cNvPr>
+          <p:cNvSpPr>
+            <a:spLocks noGrp="1"/>
+          </p:cNvSpPr>
+          <p:nvPr>
+            <p:ph type="title"/>
+          </p:nvPr>
+        </p:nvSpPr>
+        <p:spPr>
+          <a:xfrm>
+            <a:off x="457200" y="152400"/>
+            <a:ext cx="8686800" cy="3962400"/>
+          </a:xfrm>
+        </p:spPr>
+        <p:txBody>
+          <a:bodyPr anchor="b" anchorCtr="0">
+            <a:noAutofit/>
+          </a:bodyPr>
+          <a:lstStyle/>
+          <a:p>
+            <a:pPr>
+              <a:tabLst>
+                <a:tab pos="91440" algn="l"/>
+              </a:tabLst>
+            </a:pPr>
+            <a:r>
+              <a:rPr lang="en-US" sz="3600" dirty="0"/>
+              <a:t>“there would be </a:t>
+            </a:r>
+            <a:r>
+              <a:rPr lang="en-US" sz="3600" b="1" dirty="0">
+                <a:highlight>
+                  <a:srgbClr val="C00002"/>
+                </a:highlight>
+              </a:rPr>
+              <a:t>very few points of disagreement</a:t>
+            </a:r>
+            <a:r>
+              <a:rPr lang="en-US" sz="3600" dirty="0"/>
+              <a:t>—maybe one or two dozen places out of many thousands. ”</a:t>
+            </a:r>
+          </a:p>
+        </p:txBody>
+      </p:sp>
+      <p:sp>
+        <p:nvSpPr>
+          <p:cNvPr id="3" name="Text Placeholder 2">
+            <a:extLst>
+              <a:ext uri="{FF2B5EF4-FFF2-40B4-BE49-F238E27FC236}">
+                <a16:creationId xmlns:a16="http://schemas.microsoft.com/office/drawing/2014/main" id="{D79591E0-89A3-7048-B1C5-91B4FFFB65C9}"/>
+              </a:ext>
+            </a:extLst>
+          </p:cNvPr>
+          <p:cNvSpPr>
+            <a:spLocks noGrp="1"/>
+          </p:cNvSpPr>
+          <p:nvPr>
+            <p:ph type="body" sz="quarter" idx="13"/>
+          </p:nvPr>
+        </p:nvSpPr>
+        <p:spPr>
+          <a:xfrm>
+            <a:off x="114300" y="4495800"/>
+            <a:ext cx="8915400" cy="1371600"/>
+          </a:xfrm>
+        </p:spPr>
+        <p:txBody>
+          <a:bodyPr>
+            <a:normAutofit lnSpcReduction="10000"/>
+          </a:bodyPr>
+          <a:lstStyle/>
+          <a:p>
+            <a:pPr algn="l"/>
+            <a:r>
+              <a:rPr lang="en-US" sz="4400" cap="all" dirty="0">
+                <a:solidFill>
+                  <a:srgbClr val="009EC0"/>
+                </a:solidFill>
+              </a:rPr>
+              <a:t>Bart </a:t>
+            </a:r>
+            <a:r>
+              <a:rPr lang="en-US" sz="4400" cap="all" dirty="0" err="1">
+                <a:solidFill>
+                  <a:srgbClr val="009EC0"/>
+                </a:solidFill>
+              </a:rPr>
+              <a:t>Ehrman</a:t>
+            </a:r>
+            <a:br>
+              <a:rPr lang="en-US" sz="4400" dirty="0">
+                <a:solidFill>
+                  <a:srgbClr val="009EC0"/>
+                </a:solidFill>
+              </a:rPr>
+            </a:br>
+            <a:r>
+              <a:rPr lang="en-US" sz="4400" b="0" i="1" dirty="0">
+                <a:solidFill>
+                  <a:srgbClr val="009EC0"/>
+                </a:solidFill>
+              </a:rPr>
+              <a:t>Misquoting Jesus</a:t>
+            </a:r>
+          </a:p>
+        </p:txBody>
+      </p:sp>
+    </p:spTree>
+    <p:extLst>
+      <p:ext uri="{BB962C8B-B14F-4D97-AF65-F5344CB8AC3E}">
+        <p14:creationId xmlns:p14="http://schemas.microsoft.com/office/powerpoint/2010/main" val="868899881"/>
+      </p:ext>
+    </p:extLst>
+  </p:cSld>
+  <p:clrMapOvr>
+    <a:masterClrMapping/>
+  </p:clrMapOvr>
+</p:sld>
+</file>
+
 <file path=ppt/slides/slide23.xml><?xml version="1.0" encoding="utf-8"?>
 <p:sld xmlns:a="http://schemas.openxmlformats.org/drawingml/2006/main" xmlns:r="http://schemas.openxmlformats.org/officeDocument/2006/relationships" xmlns:p="http://schemas.openxmlformats.org/presentationml/2006/main">
   <p:cSld>
@@ -18645,7 +18157,11 @@
             </a:pPr>
             <a:r>
               <a:rPr lang="en-US" sz="3600" dirty="0"/>
-              <a:t>“there would be </a:t>
+              <a:t>“The position I argue for in </a:t>
+            </a:r>
+            <a:r>
+              <a:rPr lang="en-US" sz="3600" i="1" dirty="0"/>
+              <a:t>Misquoting Jesus </a:t>
             </a:r>
             <a:r>
               <a:rPr lang="en-US" sz="3600" b="1" dirty="0">
@@ -18653,11 +18169,27 @@
                   <a:srgbClr val="C00002"/>
                 </a:highlight>
               </a:rPr>
-              <a:t>very few points of disagreement</a:t>
+              <a:t>does not actually stand at odds</a:t>
+            </a:r>
+            <a:r>
+              <a:rPr lang="en-US" sz="3600" b="1" dirty="0"/>
+              <a:t> </a:t>
             </a:r>
             <a:r>
               <a:rPr lang="en-US" sz="3600" dirty="0"/>
-              <a:t>—maybe one or two dozen places out of many thousands. ”</a:t>
+              <a:t>with Prof. Metzger’s position that the </a:t>
+            </a:r>
+            <a:r>
+              <a:rPr lang="en-US" sz="3600" b="1" dirty="0">
+                <a:highlight>
+                  <a:srgbClr val="C00002"/>
+                </a:highlight>
+              </a:rPr>
+              <a:t>essential Christian beliefs are not affected by textual variants</a:t>
+            </a:r>
+            <a:r>
+              <a:rPr lang="en-US" sz="3600" dirty="0"/>
+              <a:t> in the manuscript tradition of the New Testament. ”</a:t>
             </a:r>
           </a:p>
         </p:txBody>
@@ -18728,7 +18260,7 @@
     </p:spTree>
     <p:extLst>
       <p:ext uri="{BB962C8B-B14F-4D97-AF65-F5344CB8AC3E}">
-        <p14:creationId xmlns:p14="http://schemas.microsoft.com/office/powerpoint/2010/main" val="868899881"/>
+        <p14:creationId xmlns:p14="http://schemas.microsoft.com/office/powerpoint/2010/main" val="2743984413"/>
       </p:ext>
     </p:extLst>
   </p:cSld>
@@ -18739,171 +18271,6 @@
 </file>
 
 <file path=ppt/slides/slide24.xml><?xml version="1.0" encoding="utf-8"?>
-<p:sld xmlns:a="http://schemas.openxmlformats.org/drawingml/2006/main" xmlns:r="http://schemas.openxmlformats.org/officeDocument/2006/relationships" xmlns:p="http://schemas.openxmlformats.org/presentationml/2006/main">
-  <p:cSld>
-    <p:spTree>
-      <p:nvGrpSpPr>
-        <p:cNvPr id="1" name=""/>
-        <p:cNvGrpSpPr/>
-        <p:nvPr/>
-      </p:nvGrpSpPr>
-      <p:grpSpPr>
-        <a:xfrm>
-          <a:off x="0" y="0"/>
-          <a:ext cx="0" cy="0"/>
-          <a:chOff x="0" y="0"/>
-          <a:chExt cx="0" cy="0"/>
-        </a:xfrm>
-      </p:grpSpPr>
-      <p:sp>
-        <p:nvSpPr>
-          <p:cNvPr id="2" name="Title 1">
-            <a:extLst>
-              <a:ext uri="{FF2B5EF4-FFF2-40B4-BE49-F238E27FC236}">
-                <a16:creationId xmlns:a16="http://schemas.microsoft.com/office/drawing/2014/main" id="{C8F392D1-A4F5-744A-9239-99BC6612F901}"/>
-              </a:ext>
-            </a:extLst>
-          </p:cNvPr>
-          <p:cNvSpPr>
-            <a:spLocks noGrp="1"/>
-          </p:cNvSpPr>
-          <p:nvPr>
-            <p:ph type="title"/>
-          </p:nvPr>
-        </p:nvSpPr>
-        <p:spPr>
-          <a:xfrm>
-            <a:off x="457200" y="152400"/>
-            <a:ext cx="8686800" cy="3962400"/>
-          </a:xfrm>
-        </p:spPr>
-        <p:txBody>
-          <a:bodyPr anchor="b" anchorCtr="0">
-            <a:noAutofit/>
-          </a:bodyPr>
-          <a:lstStyle/>
-          <a:p>
-            <a:pPr>
-              <a:tabLst>
-                <a:tab pos="91440" algn="l"/>
-              </a:tabLst>
-            </a:pPr>
-            <a:r>
-              <a:rPr lang="en-US" sz="3600" dirty="0"/>
-              <a:t>“The position I argue for in </a:t>
-            </a:r>
-            <a:r>
-              <a:rPr lang="en-US" sz="3600" i="1" dirty="0"/>
-              <a:t>Misquoting Jesus </a:t>
-            </a:r>
-            <a:r>
-              <a:rPr lang="en-US" sz="3600" b="1" dirty="0">
-                <a:highlight>
-                  <a:srgbClr val="C00002"/>
-                </a:highlight>
-              </a:rPr>
-              <a:t>does not actually stand at odds</a:t>
-            </a:r>
-            <a:r>
-              <a:rPr lang="en-US" sz="3600" b="1" dirty="0"/>
-              <a:t> </a:t>
-            </a:r>
-            <a:r>
-              <a:rPr lang="en-US" sz="3600" dirty="0"/>
-              <a:t>with Prof. Metzger’s position that the </a:t>
-            </a:r>
-            <a:r>
-              <a:rPr lang="en-US" sz="3600" b="1" dirty="0">
-                <a:highlight>
-                  <a:srgbClr val="C00002"/>
-                </a:highlight>
-              </a:rPr>
-              <a:t>essential Christian beliefs are not affected by textual variants</a:t>
-            </a:r>
-            <a:r>
-              <a:rPr lang="en-US" sz="3600" dirty="0"/>
-              <a:t> in the manuscript tradition of the New Testament. ”</a:t>
-            </a:r>
-          </a:p>
-        </p:txBody>
-      </p:sp>
-      <p:sp>
-        <p:nvSpPr>
-          <p:cNvPr id="3" name="Text Placeholder 2">
-            <a:extLst>
-              <a:ext uri="{FF2B5EF4-FFF2-40B4-BE49-F238E27FC236}">
-                <a16:creationId xmlns:a16="http://schemas.microsoft.com/office/drawing/2014/main" id="{D79591E0-89A3-7048-B1C5-91B4FFFB65C9}"/>
-              </a:ext>
-            </a:extLst>
-          </p:cNvPr>
-          <p:cNvSpPr>
-            <a:spLocks noGrp="1"/>
-          </p:cNvSpPr>
-          <p:nvPr>
-            <p:ph type="body" sz="quarter" idx="13"/>
-          </p:nvPr>
-        </p:nvSpPr>
-        <p:spPr>
-          <a:xfrm>
-            <a:off x="114300" y="4495800"/>
-            <a:ext cx="8915400" cy="1371600"/>
-          </a:xfrm>
-        </p:spPr>
-        <p:txBody>
-          <a:bodyPr>
-            <a:normAutofit lnSpcReduction="10000"/>
-          </a:bodyPr>
-          <a:lstStyle/>
-          <a:p>
-            <a:pPr algn="l"/>
-            <a:r>
-              <a:rPr lang="en-US" sz="4400" cap="all" dirty="0">
-                <a:solidFill>
-                  <a:srgbClr val="009EC0"/>
-                </a:solidFill>
-              </a:rPr>
-              <a:t>Bart </a:t>
-            </a:r>
-            <a:r>
-              <a:rPr lang="en-US" sz="4400" cap="all" dirty="0" err="1">
-                <a:solidFill>
-                  <a:srgbClr val="009EC0"/>
-                </a:solidFill>
-              </a:rPr>
-              <a:t>Ehrman</a:t>
-            </a:r>
-            <a:br>
-              <a:rPr lang="en-US" sz="4400" dirty="0">
-                <a:solidFill>
-                  <a:srgbClr val="009EC0"/>
-                </a:solidFill>
-              </a:rPr>
-            </a:br>
-            <a:r>
-              <a:rPr lang="en-US" sz="4400" b="0" i="1" dirty="0">
-                <a:solidFill>
-                  <a:srgbClr val="009EC0"/>
-                </a:solidFill>
-              </a:rPr>
-              <a:t>Misquoting Jesus</a:t>
-            </a:r>
-          </a:p>
-        </p:txBody>
-      </p:sp>
-    </p:spTree>
-    <p:extLst>
-      <p:ext uri="{BB962C8B-B14F-4D97-AF65-F5344CB8AC3E}">
-        <p14:creationId xmlns:p14="http://schemas.microsoft.com/office/powerpoint/2010/main" val="2743984413"/>
-      </p:ext>
-    </p:extLst>
-  </p:cSld>
-  <p:clrMapOvr>
-    <a:masterClrMapping/>
-  </p:clrMapOvr>
-</p:sld>
-</file>
-
-<file path=ppt/slides/slide25.xml><?xml version="1.0" encoding="utf-8"?>
 <p:sld xmlns:a="http://schemas.openxmlformats.org/drawingml/2006/main" xmlns:r="http://schemas.openxmlformats.org/officeDocument/2006/relationships" xmlns:p="http://schemas.openxmlformats.org/presentationml/2006/main">
   <p:cSld>
     <p:spTree>
@@ -19042,7 +18409,7 @@
 </p:sld>
 </file>
 
-<file path=ppt/slides/slide26.xml><?xml version="1.0" encoding="utf-8"?>
+<file path=ppt/slides/slide25.xml><?xml version="1.0" encoding="utf-8"?>
 <p:sld xmlns:a="http://schemas.openxmlformats.org/drawingml/2006/main" xmlns:r="http://schemas.openxmlformats.org/officeDocument/2006/relationships" xmlns:p="http://schemas.openxmlformats.org/presentationml/2006/main">
   <p:cSld>
     <p:spTree>
@@ -19118,7 +18485,7 @@
 </p:sld>
 </file>
 
-<file path=ppt/slides/slide27.xml><?xml version="1.0" encoding="utf-8"?>
+<file path=ppt/slides/slide26.xml><?xml version="1.0" encoding="utf-8"?>
 <p:sld xmlns:a="http://schemas.openxmlformats.org/drawingml/2006/main" xmlns:r="http://schemas.openxmlformats.org/officeDocument/2006/relationships" xmlns:p="http://schemas.openxmlformats.org/presentationml/2006/main">
   <p:cSld>
     <p:spTree>
@@ -19312,7 +18679,7 @@
 </p:sld>
 </file>
 
-<file path=ppt/slides/slide28.xml><?xml version="1.0" encoding="utf-8"?>
+<file path=ppt/slides/slide27.xml><?xml version="1.0" encoding="utf-8"?>
 <p:sld xmlns:a="http://schemas.openxmlformats.org/drawingml/2006/main" xmlns:r="http://schemas.openxmlformats.org/officeDocument/2006/relationships" xmlns:p="http://schemas.openxmlformats.org/presentationml/2006/main">
   <p:cSld>
     <p:spTree>
@@ -19388,7 +18755,7 @@
 </p:sld>
 </file>
 
-<file path=ppt/slides/slide29.xml><?xml version="1.0" encoding="utf-8"?>
+<file path=ppt/slides/slide28.xml><?xml version="1.0" encoding="utf-8"?>
 <p:sld xmlns:a="http://schemas.openxmlformats.org/drawingml/2006/main" xmlns:r="http://schemas.openxmlformats.org/officeDocument/2006/relationships" xmlns:p="http://schemas.openxmlformats.org/presentationml/2006/main">
   <p:cSld>
     <p:spTree>
@@ -19464,267 +18831,7 @@
 </p:sld>
 </file>
 
-<file path=ppt/slides/slide3.xml><?xml version="1.0" encoding="utf-8"?>
-<p:sld xmlns:a="http://schemas.openxmlformats.org/drawingml/2006/main" xmlns:r="http://schemas.openxmlformats.org/officeDocument/2006/relationships" xmlns:p="http://schemas.openxmlformats.org/presentationml/2006/main">
-  <p:cSld>
-    <p:spTree>
-      <p:nvGrpSpPr>
-        <p:cNvPr id="1" name=""/>
-        <p:cNvGrpSpPr/>
-        <p:nvPr/>
-      </p:nvGrpSpPr>
-      <p:grpSpPr>
-        <a:xfrm>
-          <a:off x="0" y="0"/>
-          <a:ext cx="0" cy="0"/>
-          <a:chOff x="0" y="0"/>
-          <a:chExt cx="0" cy="0"/>
-        </a:xfrm>
-      </p:grpSpPr>
-      <p:pic>
-        <p:nvPicPr>
-          <p:cNvPr id="1030" name="Picture 6" descr="Bart D. Ehrman - Wikipedia">
-            <a:extLst>
-              <a:ext uri="{FF2B5EF4-FFF2-40B4-BE49-F238E27FC236}">
-                <a16:creationId xmlns:a16="http://schemas.microsoft.com/office/drawing/2014/main" id="{C4492C44-61D4-3B4F-96A3-AC804077F4EE}"/>
-              </a:ext>
-            </a:extLst>
-          </p:cNvPr>
-          <p:cNvPicPr>
-            <a:picLocks noChangeAspect="1" noChangeArrowheads="1"/>
-          </p:cNvPicPr>
-          <p:nvPr/>
-        </p:nvPicPr>
-        <p:blipFill>
-          <a:blip r:embed="rId2" cstate="print">
-            <a:extLst>
-              <a:ext uri="{28A0092B-C50C-407E-A947-70E740481C1C}">
-                <a14:useLocalDpi xmlns:a14="http://schemas.microsoft.com/office/drawing/2010/main" val="0"/>
-              </a:ext>
-            </a:extLst>
-          </a:blip>
-          <a:srcRect/>
-          <a:stretch>
-            <a:fillRect/>
-          </a:stretch>
-        </p:blipFill>
-        <p:spPr bwMode="auto">
-          <a:xfrm>
-            <a:off x="3962400" y="0"/>
-            <a:ext cx="5808663" cy="6858000"/>
-          </a:xfrm>
-          <a:prstGeom prst="rect">
-            <a:avLst/>
-          </a:prstGeom>
-          <a:noFill/>
-          <a:extLst>
-            <a:ext uri="{909E8E84-426E-40DD-AFC4-6F175D3DCCD1}">
-              <a14:hiddenFill xmlns:a14="http://schemas.microsoft.com/office/drawing/2010/main">
-                <a:solidFill>
-                  <a:srgbClr val="FFFFFF"/>
-                </a:solidFill>
-              </a14:hiddenFill>
-            </a:ext>
-          </a:extLst>
-        </p:spPr>
-      </p:pic>
-      <p:pic>
-        <p:nvPicPr>
-          <p:cNvPr id="1026" name="Picture 2" descr="Misquoting Jesus: The Story Behind Who Changed the Bible and Why ...">
-            <a:extLst>
-              <a:ext uri="{FF2B5EF4-FFF2-40B4-BE49-F238E27FC236}">
-                <a16:creationId xmlns:a16="http://schemas.microsoft.com/office/drawing/2014/main" id="{57800C52-FF78-2F44-A63F-DF1ED9C324CB}"/>
-              </a:ext>
-            </a:extLst>
-          </p:cNvPr>
-          <p:cNvPicPr>
-            <a:picLocks noChangeAspect="1" noChangeArrowheads="1"/>
-          </p:cNvPicPr>
-          <p:nvPr/>
-        </p:nvPicPr>
-        <p:blipFill>
-          <a:blip r:embed="rId3">
-            <a:extLst>
-              <a:ext uri="{28A0092B-C50C-407E-A947-70E740481C1C}">
-                <a14:useLocalDpi xmlns:a14="http://schemas.microsoft.com/office/drawing/2010/main" val="0"/>
-              </a:ext>
-            </a:extLst>
-          </a:blip>
-          <a:srcRect/>
-          <a:stretch>
-            <a:fillRect/>
-          </a:stretch>
-        </p:blipFill>
-        <p:spPr bwMode="auto">
-          <a:xfrm>
-            <a:off x="0" y="0"/>
-            <a:ext cx="4503737" cy="6858000"/>
-          </a:xfrm>
-          <a:prstGeom prst="rect">
-            <a:avLst/>
-          </a:prstGeom>
-          <a:noFill/>
-          <a:extLst>
-            <a:ext uri="{909E8E84-426E-40DD-AFC4-6F175D3DCCD1}">
-              <a14:hiddenFill xmlns:a14="http://schemas.microsoft.com/office/drawing/2010/main">
-                <a:solidFill>
-                  <a:srgbClr val="FFFFFF"/>
-                </a:solidFill>
-              </a14:hiddenFill>
-            </a:ext>
-          </a:extLst>
-        </p:spPr>
-      </p:pic>
-    </p:spTree>
-    <p:extLst>
-      <p:ext uri="{BB962C8B-B14F-4D97-AF65-F5344CB8AC3E}">
-        <p14:creationId xmlns:p14="http://schemas.microsoft.com/office/powerpoint/2010/main" val="1142245529"/>
-      </p:ext>
-    </p:extLst>
-  </p:cSld>
-  <p:clrMapOvr>
-    <a:masterClrMapping/>
-  </p:clrMapOvr>
-  <p:timing>
-    <p:tnLst>
-      <p:par>
-        <p:cTn id="1" dur="indefinite" restart="never" nodeType="tmRoot">
-          <p:childTnLst>
-            <p:seq concurrent="1" nextAc="seek">
-              <p:cTn id="2" dur="indefinite" nodeType="mainSeq">
-                <p:childTnLst>
-                  <p:par>
-                    <p:cTn id="3" fill="hold">
-                      <p:stCondLst>
-                        <p:cond delay="indefinite"/>
-                      </p:stCondLst>
-                      <p:childTnLst>
-                        <p:par>
-                          <p:cTn id="4" fill="hold">
-                            <p:stCondLst>
-                              <p:cond delay="0"/>
-                            </p:stCondLst>
-                            <p:childTnLst>
-                              <p:par>
-                                <p:cTn id="5" presetID="10" presetClass="entr" presetSubtype="0" fill="hold" nodeType="clickEffect">
-                                  <p:stCondLst>
-                                    <p:cond delay="0"/>
-                                  </p:stCondLst>
-                                  <p:childTnLst>
-                                    <p:set>
-                                      <p:cBhvr>
-                                        <p:cTn id="6" dur="1" fill="hold">
-                                          <p:stCondLst>
-                                            <p:cond delay="0"/>
-                                          </p:stCondLst>
-                                        </p:cTn>
-                                        <p:tgtEl>
-                                          <p:spTgt spid="1026"/>
-                                        </p:tgtEl>
-                                        <p:attrNameLst>
-                                          <p:attrName>style.visibility</p:attrName>
-                                        </p:attrNameLst>
-                                      </p:cBhvr>
-                                      <p:to>
-                                        <p:strVal val="visible"/>
-                                      </p:to>
-                                    </p:set>
-                                    <p:animEffect transition="in" filter="fade">
-                                      <p:cBhvr>
-                                        <p:cTn id="7" dur="250"/>
-                                        <p:tgtEl>
-                                          <p:spTgt spid="1026"/>
-                                        </p:tgtEl>
-                                      </p:cBhvr>
-                                    </p:animEffect>
-                                  </p:childTnLst>
-                                </p:cTn>
-                              </p:par>
-                            </p:childTnLst>
-                          </p:cTn>
-                        </p:par>
-                      </p:childTnLst>
-                    </p:cTn>
-                  </p:par>
-                  <p:par>
-                    <p:cTn id="8" fill="hold">
-                      <p:stCondLst>
-                        <p:cond delay="indefinite"/>
-                      </p:stCondLst>
-                      <p:childTnLst>
-                        <p:par>
-                          <p:cTn id="9" fill="hold">
-                            <p:stCondLst>
-                              <p:cond delay="0"/>
-                            </p:stCondLst>
-                            <p:childTnLst>
-                              <p:par>
-                                <p:cTn id="10" presetID="10" presetClass="entr" presetSubtype="0" fill="hold" nodeType="clickEffect">
-                                  <p:stCondLst>
-                                    <p:cond delay="0"/>
-                                  </p:stCondLst>
-                                  <p:childTnLst>
-                                    <p:set>
-                                      <p:cBhvr>
-                                        <p:cTn id="11" dur="1" fill="hold">
-                                          <p:stCondLst>
-                                            <p:cond delay="0"/>
-                                          </p:stCondLst>
-                                        </p:cTn>
-                                        <p:tgtEl>
-                                          <p:spTgt spid="1030"/>
-                                        </p:tgtEl>
-                                        <p:attrNameLst>
-                                          <p:attrName>style.visibility</p:attrName>
-                                        </p:attrNameLst>
-                                      </p:cBhvr>
-                                      <p:to>
-                                        <p:strVal val="visible"/>
-                                      </p:to>
-                                    </p:set>
-                                    <p:animEffect transition="in" filter="fade">
-                                      <p:cBhvr>
-                                        <p:cTn id="12" dur="250"/>
-                                        <p:tgtEl>
-                                          <p:spTgt spid="1030"/>
-                                        </p:tgtEl>
-                                      </p:cBhvr>
-                                    </p:animEffect>
-                                  </p:childTnLst>
-                                </p:cTn>
-                              </p:par>
-                            </p:childTnLst>
-                          </p:cTn>
-                        </p:par>
-                      </p:childTnLst>
-                    </p:cTn>
-                  </p:par>
-                </p:childTnLst>
-              </p:cTn>
-              <p:prevCondLst>
-                <p:cond evt="onPrev" delay="0">
-                  <p:tgtEl>
-                    <p:sldTgt/>
-                  </p:tgtEl>
-                </p:cond>
-              </p:prevCondLst>
-              <p:nextCondLst>
-                <p:cond evt="onNext" delay="0">
-                  <p:tgtEl>
-                    <p:sldTgt/>
-                  </p:tgtEl>
-                </p:cond>
-              </p:nextCondLst>
-            </p:seq>
-          </p:childTnLst>
-        </p:cTn>
-      </p:par>
-    </p:tnLst>
-  </p:timing>
-</p:sld>
-</file>
-
-<file path=ppt/slides/slide30.xml><?xml version="1.0" encoding="utf-8"?>
+<file path=ppt/slides/slide29.xml><?xml version="1.0" encoding="utf-8"?>
 <p:sld xmlns:a="http://schemas.openxmlformats.org/drawingml/2006/main" xmlns:r="http://schemas.openxmlformats.org/officeDocument/2006/relationships" xmlns:p="http://schemas.openxmlformats.org/presentationml/2006/main" show="0">
   <p:cSld>
     <p:spTree>
@@ -24291,7 +23398,267 @@
 </p:sld>
 </file>
 
-<file path=ppt/slides/slide31.xml><?xml version="1.0" encoding="utf-8"?>
+<file path=ppt/slides/slide3.xml><?xml version="1.0" encoding="utf-8"?>
+<p:sld xmlns:a="http://schemas.openxmlformats.org/drawingml/2006/main" xmlns:r="http://schemas.openxmlformats.org/officeDocument/2006/relationships" xmlns:p="http://schemas.openxmlformats.org/presentationml/2006/main">
+  <p:cSld>
+    <p:spTree>
+      <p:nvGrpSpPr>
+        <p:cNvPr id="1" name=""/>
+        <p:cNvGrpSpPr/>
+        <p:nvPr/>
+      </p:nvGrpSpPr>
+      <p:grpSpPr>
+        <a:xfrm>
+          <a:off x="0" y="0"/>
+          <a:ext cx="0" cy="0"/>
+          <a:chOff x="0" y="0"/>
+          <a:chExt cx="0" cy="0"/>
+        </a:xfrm>
+      </p:grpSpPr>
+      <p:pic>
+        <p:nvPicPr>
+          <p:cNvPr id="1030" name="Picture 6" descr="Bart D. Ehrman - Wikipedia">
+            <a:extLst>
+              <a:ext uri="{FF2B5EF4-FFF2-40B4-BE49-F238E27FC236}">
+                <a16:creationId xmlns:a16="http://schemas.microsoft.com/office/drawing/2014/main" id="{C4492C44-61D4-3B4F-96A3-AC804077F4EE}"/>
+              </a:ext>
+            </a:extLst>
+          </p:cNvPr>
+          <p:cNvPicPr>
+            <a:picLocks noChangeAspect="1" noChangeArrowheads="1"/>
+          </p:cNvPicPr>
+          <p:nvPr/>
+        </p:nvPicPr>
+        <p:blipFill>
+          <a:blip r:embed="rId2" cstate="print">
+            <a:extLst>
+              <a:ext uri="{28A0092B-C50C-407E-A947-70E740481C1C}">
+                <a14:useLocalDpi xmlns:a14="http://schemas.microsoft.com/office/drawing/2010/main" val="0"/>
+              </a:ext>
+            </a:extLst>
+          </a:blip>
+          <a:srcRect/>
+          <a:stretch>
+            <a:fillRect/>
+          </a:stretch>
+        </p:blipFill>
+        <p:spPr bwMode="auto">
+          <a:xfrm>
+            <a:off x="3962400" y="0"/>
+            <a:ext cx="5808663" cy="6858000"/>
+          </a:xfrm>
+          <a:prstGeom prst="rect">
+            <a:avLst/>
+          </a:prstGeom>
+          <a:noFill/>
+          <a:extLst>
+            <a:ext uri="{909E8E84-426E-40DD-AFC4-6F175D3DCCD1}">
+              <a14:hiddenFill xmlns:a14="http://schemas.microsoft.com/office/drawing/2010/main">
+                <a:solidFill>
+                  <a:srgbClr val="FFFFFF"/>
+                </a:solidFill>
+              </a14:hiddenFill>
+            </a:ext>
+          </a:extLst>
+        </p:spPr>
+      </p:pic>
+      <p:pic>
+        <p:nvPicPr>
+          <p:cNvPr id="1026" name="Picture 2" descr="Misquoting Jesus: The Story Behind Who Changed the Bible and Why ...">
+            <a:extLst>
+              <a:ext uri="{FF2B5EF4-FFF2-40B4-BE49-F238E27FC236}">
+                <a16:creationId xmlns:a16="http://schemas.microsoft.com/office/drawing/2014/main" id="{57800C52-FF78-2F44-A63F-DF1ED9C324CB}"/>
+              </a:ext>
+            </a:extLst>
+          </p:cNvPr>
+          <p:cNvPicPr>
+            <a:picLocks noChangeAspect="1" noChangeArrowheads="1"/>
+          </p:cNvPicPr>
+          <p:nvPr/>
+        </p:nvPicPr>
+        <p:blipFill>
+          <a:blip r:embed="rId3">
+            <a:extLst>
+              <a:ext uri="{28A0092B-C50C-407E-A947-70E740481C1C}">
+                <a14:useLocalDpi xmlns:a14="http://schemas.microsoft.com/office/drawing/2010/main" val="0"/>
+              </a:ext>
+            </a:extLst>
+          </a:blip>
+          <a:srcRect/>
+          <a:stretch>
+            <a:fillRect/>
+          </a:stretch>
+        </p:blipFill>
+        <p:spPr bwMode="auto">
+          <a:xfrm>
+            <a:off x="0" y="0"/>
+            <a:ext cx="4503737" cy="6858000"/>
+          </a:xfrm>
+          <a:prstGeom prst="rect">
+            <a:avLst/>
+          </a:prstGeom>
+          <a:noFill/>
+          <a:extLst>
+            <a:ext uri="{909E8E84-426E-40DD-AFC4-6F175D3DCCD1}">
+              <a14:hiddenFill xmlns:a14="http://schemas.microsoft.com/office/drawing/2010/main">
+                <a:solidFill>
+                  <a:srgbClr val="FFFFFF"/>
+                </a:solidFill>
+              </a14:hiddenFill>
+            </a:ext>
+          </a:extLst>
+        </p:spPr>
+      </p:pic>
+    </p:spTree>
+    <p:extLst>
+      <p:ext uri="{BB962C8B-B14F-4D97-AF65-F5344CB8AC3E}">
+        <p14:creationId xmlns:p14="http://schemas.microsoft.com/office/powerpoint/2010/main" val="1142245529"/>
+      </p:ext>
+    </p:extLst>
+  </p:cSld>
+  <p:clrMapOvr>
+    <a:masterClrMapping/>
+  </p:clrMapOvr>
+  <p:timing>
+    <p:tnLst>
+      <p:par>
+        <p:cTn id="1" dur="indefinite" restart="never" nodeType="tmRoot">
+          <p:childTnLst>
+            <p:seq concurrent="1" nextAc="seek">
+              <p:cTn id="2" dur="indefinite" nodeType="mainSeq">
+                <p:childTnLst>
+                  <p:par>
+                    <p:cTn id="3" fill="hold">
+                      <p:stCondLst>
+                        <p:cond delay="indefinite"/>
+                      </p:stCondLst>
+                      <p:childTnLst>
+                        <p:par>
+                          <p:cTn id="4" fill="hold">
+                            <p:stCondLst>
+                              <p:cond delay="0"/>
+                            </p:stCondLst>
+                            <p:childTnLst>
+                              <p:par>
+                                <p:cTn id="5" presetID="10" presetClass="entr" presetSubtype="0" fill="hold" nodeType="clickEffect">
+                                  <p:stCondLst>
+                                    <p:cond delay="0"/>
+                                  </p:stCondLst>
+                                  <p:childTnLst>
+                                    <p:set>
+                                      <p:cBhvr>
+                                        <p:cTn id="6" dur="1" fill="hold">
+                                          <p:stCondLst>
+                                            <p:cond delay="0"/>
+                                          </p:stCondLst>
+                                        </p:cTn>
+                                        <p:tgtEl>
+                                          <p:spTgt spid="1026"/>
+                                        </p:tgtEl>
+                                        <p:attrNameLst>
+                                          <p:attrName>style.visibility</p:attrName>
+                                        </p:attrNameLst>
+                                      </p:cBhvr>
+                                      <p:to>
+                                        <p:strVal val="visible"/>
+                                      </p:to>
+                                    </p:set>
+                                    <p:animEffect transition="in" filter="fade">
+                                      <p:cBhvr>
+                                        <p:cTn id="7" dur="250"/>
+                                        <p:tgtEl>
+                                          <p:spTgt spid="1026"/>
+                                        </p:tgtEl>
+                                      </p:cBhvr>
+                                    </p:animEffect>
+                                  </p:childTnLst>
+                                </p:cTn>
+                              </p:par>
+                            </p:childTnLst>
+                          </p:cTn>
+                        </p:par>
+                      </p:childTnLst>
+                    </p:cTn>
+                  </p:par>
+                  <p:par>
+                    <p:cTn id="8" fill="hold">
+                      <p:stCondLst>
+                        <p:cond delay="indefinite"/>
+                      </p:stCondLst>
+                      <p:childTnLst>
+                        <p:par>
+                          <p:cTn id="9" fill="hold">
+                            <p:stCondLst>
+                              <p:cond delay="0"/>
+                            </p:stCondLst>
+                            <p:childTnLst>
+                              <p:par>
+                                <p:cTn id="10" presetID="10" presetClass="entr" presetSubtype="0" fill="hold" nodeType="clickEffect">
+                                  <p:stCondLst>
+                                    <p:cond delay="0"/>
+                                  </p:stCondLst>
+                                  <p:childTnLst>
+                                    <p:set>
+                                      <p:cBhvr>
+                                        <p:cTn id="11" dur="1" fill="hold">
+                                          <p:stCondLst>
+                                            <p:cond delay="0"/>
+                                          </p:stCondLst>
+                                        </p:cTn>
+                                        <p:tgtEl>
+                                          <p:spTgt spid="1030"/>
+                                        </p:tgtEl>
+                                        <p:attrNameLst>
+                                          <p:attrName>style.visibility</p:attrName>
+                                        </p:attrNameLst>
+                                      </p:cBhvr>
+                                      <p:to>
+                                        <p:strVal val="visible"/>
+                                      </p:to>
+                                    </p:set>
+                                    <p:animEffect transition="in" filter="fade">
+                                      <p:cBhvr>
+                                        <p:cTn id="12" dur="250"/>
+                                        <p:tgtEl>
+                                          <p:spTgt spid="1030"/>
+                                        </p:tgtEl>
+                                      </p:cBhvr>
+                                    </p:animEffect>
+                                  </p:childTnLst>
+                                </p:cTn>
+                              </p:par>
+                            </p:childTnLst>
+                          </p:cTn>
+                        </p:par>
+                      </p:childTnLst>
+                    </p:cTn>
+                  </p:par>
+                </p:childTnLst>
+              </p:cTn>
+              <p:prevCondLst>
+                <p:cond evt="onPrev" delay="0">
+                  <p:tgtEl>
+                    <p:sldTgt/>
+                  </p:tgtEl>
+                </p:cond>
+              </p:prevCondLst>
+              <p:nextCondLst>
+                <p:cond evt="onNext" delay="0">
+                  <p:tgtEl>
+                    <p:sldTgt/>
+                  </p:tgtEl>
+                </p:cond>
+              </p:nextCondLst>
+            </p:seq>
+          </p:childTnLst>
+        </p:cTn>
+      </p:par>
+    </p:tnLst>
+  </p:timing>
+</p:sld>
+</file>
+
+<file path=ppt/slides/slide30.xml><?xml version="1.0" encoding="utf-8"?>
 <p:sld xmlns:a="http://schemas.openxmlformats.org/drawingml/2006/main" xmlns:r="http://schemas.openxmlformats.org/officeDocument/2006/relationships" xmlns:p="http://schemas.openxmlformats.org/presentationml/2006/main" show="0">
   <p:cSld>
     <p:spTree>
@@ -30000,7 +29367,7 @@
 </p:sld>
 </file>
 
-<file path=ppt/slides/slide32.xml><?xml version="1.0" encoding="utf-8"?>
+<file path=ppt/slides/slide31.xml><?xml version="1.0" encoding="utf-8"?>
 <p:sld xmlns:a="http://schemas.openxmlformats.org/drawingml/2006/main" xmlns:r="http://schemas.openxmlformats.org/officeDocument/2006/relationships" xmlns:p="http://schemas.openxmlformats.org/presentationml/2006/main" show="0">
   <p:cSld>
     <p:spTree>
@@ -30115,7 +29482,7 @@
 </p:sld>
 </file>
 
-<file path=ppt/slides/slide33.xml><?xml version="1.0" encoding="utf-8"?>
+<file path=ppt/slides/slide32.xml><?xml version="1.0" encoding="utf-8"?>
 <p:sld xmlns:a="http://schemas.openxmlformats.org/drawingml/2006/main" xmlns:r="http://schemas.openxmlformats.org/officeDocument/2006/relationships" xmlns:p="http://schemas.openxmlformats.org/presentationml/2006/main" show="0">
   <p:cSld>
     <p:spTree>
@@ -30250,7 +29617,7 @@
 </p:sld>
 </file>
 
-<file path=ppt/slides/slide34.xml><?xml version="1.0" encoding="utf-8"?>
+<file path=ppt/slides/slide33.xml><?xml version="1.0" encoding="utf-8"?>
 <p:sld xmlns:a="http://schemas.openxmlformats.org/drawingml/2006/main" xmlns:r="http://schemas.openxmlformats.org/officeDocument/2006/relationships" xmlns:p="http://schemas.openxmlformats.org/presentationml/2006/main" show="0">
   <p:cSld>
     <p:spTree>
@@ -30334,7 +29701,7 @@
 </p:sld>
 </file>
 
-<file path=ppt/slides/slide35.xml><?xml version="1.0" encoding="utf-8"?>
+<file path=ppt/slides/slide34.xml><?xml version="1.0" encoding="utf-8"?>
 <p:sld xmlns:a="http://schemas.openxmlformats.org/drawingml/2006/main" xmlns:r="http://schemas.openxmlformats.org/officeDocument/2006/relationships" xmlns:p="http://schemas.openxmlformats.org/presentationml/2006/main">
   <p:cSld>
     <p:spTree>
@@ -30784,7 +30151,7 @@
 </p:sld>
 </file>
 
-<file path=ppt/slides/slide36.xml><?xml version="1.0" encoding="utf-8"?>
+<file path=ppt/slides/slide35.xml><?xml version="1.0" encoding="utf-8"?>
 <p:sld xmlns:a="http://schemas.openxmlformats.org/drawingml/2006/main" xmlns:r="http://schemas.openxmlformats.org/officeDocument/2006/relationships" xmlns:p="http://schemas.openxmlformats.org/presentationml/2006/main">
   <p:cSld>
     <p:spTree>
@@ -31346,7 +30713,7 @@
 </p:sld>
 </file>
 
-<file path=ppt/slides/slide37.xml><?xml version="1.0" encoding="utf-8"?>
+<file path=ppt/slides/slide36.xml><?xml version="1.0" encoding="utf-8"?>
 <p:sld xmlns:a="http://schemas.openxmlformats.org/drawingml/2006/main" xmlns:r="http://schemas.openxmlformats.org/officeDocument/2006/relationships" xmlns:p="http://schemas.openxmlformats.org/presentationml/2006/main">
   <p:cSld>
     <p:spTree>
@@ -31422,7 +30789,7 @@
 </p:sld>
 </file>
 
-<file path=ppt/slides/slide38.xml><?xml version="1.0" encoding="utf-8"?>
+<file path=ppt/slides/slide37.xml><?xml version="1.0" encoding="utf-8"?>
 <p:sld xmlns:a="http://schemas.openxmlformats.org/drawingml/2006/main" xmlns:r="http://schemas.openxmlformats.org/officeDocument/2006/relationships" xmlns:p="http://schemas.openxmlformats.org/presentationml/2006/main">
   <p:cSld>
     <p:spTree>
@@ -32602,7 +31969,7 @@
 </p:sld>
 </file>
 
-<file path=ppt/slides/slide39.xml><?xml version="1.0" encoding="utf-8"?>
+<file path=ppt/slides/slide38.xml><?xml version="1.0" encoding="utf-8"?>
 <p:sld xmlns:a="http://schemas.openxmlformats.org/drawingml/2006/main" xmlns:r="http://schemas.openxmlformats.org/officeDocument/2006/relationships" xmlns:p="http://schemas.openxmlformats.org/presentationml/2006/main">
   <p:cSld>
     <p:spTree>
@@ -33702,724 +33069,7 @@
 </p:sld>
 </file>
 
-<file path=ppt/slides/slide4.xml><?xml version="1.0" encoding="utf-8"?>
-<p:sld xmlns:a="http://schemas.openxmlformats.org/drawingml/2006/main" xmlns:r="http://schemas.openxmlformats.org/officeDocument/2006/relationships" xmlns:p="http://schemas.openxmlformats.org/presentationml/2006/main">
-  <p:cSld>
-    <p:spTree>
-      <p:nvGrpSpPr>
-        <p:cNvPr id="1" name=""/>
-        <p:cNvGrpSpPr/>
-        <p:nvPr/>
-      </p:nvGrpSpPr>
-      <p:grpSpPr>
-        <a:xfrm>
-          <a:off x="0" y="0"/>
-          <a:ext cx="0" cy="0"/>
-          <a:chOff x="0" y="0"/>
-          <a:chExt cx="0" cy="0"/>
-        </a:xfrm>
-      </p:grpSpPr>
-      <p:grpSp>
-        <p:nvGrpSpPr>
-          <p:cNvPr id="4" name="Group 3">
-            <a:extLst>
-              <a:ext uri="{FF2B5EF4-FFF2-40B4-BE49-F238E27FC236}">
-                <a16:creationId xmlns:a16="http://schemas.microsoft.com/office/drawing/2014/main" id="{76D0AD62-610F-2343-9B0E-52F648458EA8}"/>
-              </a:ext>
-            </a:extLst>
-          </p:cNvPr>
-          <p:cNvGrpSpPr/>
-          <p:nvPr/>
-        </p:nvGrpSpPr>
-        <p:grpSpPr>
-          <a:xfrm>
-            <a:off x="209549" y="1669464"/>
-            <a:ext cx="8724901" cy="954107"/>
-            <a:chOff x="304800" y="4648200"/>
-            <a:chExt cx="8724901" cy="954107"/>
-          </a:xfrm>
-        </p:grpSpPr>
-        <p:sp>
-          <p:nvSpPr>
-            <p:cNvPr id="2" name="TextBox 1">
-              <a:extLst>
-                <a:ext uri="{FF2B5EF4-FFF2-40B4-BE49-F238E27FC236}">
-                  <a16:creationId xmlns:a16="http://schemas.microsoft.com/office/drawing/2014/main" id="{65E69FF4-5D6C-1F4A-BC1D-8328E1004154}"/>
-                </a:ext>
-              </a:extLst>
-            </p:cNvPr>
-            <p:cNvSpPr txBox="1"/>
-            <p:nvPr/>
-          </p:nvSpPr>
-          <p:spPr>
-            <a:xfrm>
-              <a:off x="304800" y="4648200"/>
-              <a:ext cx="1147943" cy="523220"/>
-            </a:xfrm>
-            <a:prstGeom prst="rect">
-              <a:avLst/>
-            </a:prstGeom>
-            <a:noFill/>
-          </p:spPr>
-          <p:txBody>
-            <a:bodyPr wrap="none" rtlCol="0">
-              <a:spAutoFit/>
-            </a:bodyPr>
-            <a:lstStyle/>
-            <a:p>
-              <a:r>
-                <a:rPr lang="en-US" sz="2800" dirty="0">
-                  <a:solidFill>
-                    <a:srgbClr val="009EC0"/>
-                  </a:solidFill>
-                </a:rPr>
-                <a:t>What?</a:t>
-              </a:r>
-            </a:p>
-          </p:txBody>
-        </p:sp>
-        <p:sp>
-          <p:nvSpPr>
-            <p:cNvPr id="3" name="TextBox 2">
-              <a:extLst>
-                <a:ext uri="{FF2B5EF4-FFF2-40B4-BE49-F238E27FC236}">
-                  <a16:creationId xmlns:a16="http://schemas.microsoft.com/office/drawing/2014/main" id="{E796A5EC-87C6-D048-8010-771FD1CA8E24}"/>
-                </a:ext>
-              </a:extLst>
-            </p:cNvPr>
-            <p:cNvSpPr txBox="1"/>
-            <p:nvPr/>
-          </p:nvSpPr>
-          <p:spPr>
-            <a:xfrm>
-              <a:off x="1600201" y="4648200"/>
-              <a:ext cx="7429500" cy="954107"/>
-            </a:xfrm>
-            <a:prstGeom prst="rect">
-              <a:avLst/>
-            </a:prstGeom>
-            <a:noFill/>
-          </p:spPr>
-          <p:txBody>
-            <a:bodyPr wrap="square" rtlCol="0">
-              <a:spAutoFit/>
-            </a:bodyPr>
-            <a:lstStyle/>
-            <a:p>
-              <a:r>
-                <a:rPr lang="en-US" sz="2800" dirty="0"/>
-                <a:t>Know how we can determine what the original accounts said despite not having the originals</a:t>
-              </a:r>
-            </a:p>
-          </p:txBody>
-        </p:sp>
-      </p:grpSp>
-      <p:grpSp>
-        <p:nvGrpSpPr>
-          <p:cNvPr id="6" name="Group 5">
-            <a:extLst>
-              <a:ext uri="{FF2B5EF4-FFF2-40B4-BE49-F238E27FC236}">
-                <a16:creationId xmlns:a16="http://schemas.microsoft.com/office/drawing/2014/main" id="{16DEED69-411E-5C47-8C2F-1FA7F3AC4BAB}"/>
-              </a:ext>
-            </a:extLst>
-          </p:cNvPr>
-          <p:cNvGrpSpPr/>
-          <p:nvPr/>
-        </p:nvGrpSpPr>
-        <p:grpSpPr>
-          <a:xfrm>
-            <a:off x="209549" y="2779693"/>
-            <a:ext cx="8724901" cy="954107"/>
-            <a:chOff x="304800" y="4648200"/>
-            <a:chExt cx="8724901" cy="954107"/>
-          </a:xfrm>
-        </p:grpSpPr>
-        <p:sp>
-          <p:nvSpPr>
-            <p:cNvPr id="7" name="TextBox 6">
-              <a:extLst>
-                <a:ext uri="{FF2B5EF4-FFF2-40B4-BE49-F238E27FC236}">
-                  <a16:creationId xmlns:a16="http://schemas.microsoft.com/office/drawing/2014/main" id="{0BE67C1E-EE53-F64B-A1C4-C71C7BD5283F}"/>
-                </a:ext>
-              </a:extLst>
-            </p:cNvPr>
-            <p:cNvSpPr txBox="1"/>
-            <p:nvPr/>
-          </p:nvSpPr>
-          <p:spPr>
-            <a:xfrm>
-              <a:off x="304800" y="4648200"/>
-              <a:ext cx="1014765" cy="523220"/>
-            </a:xfrm>
-            <a:prstGeom prst="rect">
-              <a:avLst/>
-            </a:prstGeom>
-            <a:noFill/>
-          </p:spPr>
-          <p:txBody>
-            <a:bodyPr wrap="none" rtlCol="0">
-              <a:spAutoFit/>
-            </a:bodyPr>
-            <a:lstStyle/>
-            <a:p>
-              <a:r>
-                <a:rPr lang="en-US" sz="2800" dirty="0">
-                  <a:solidFill>
-                    <a:srgbClr val="009EC0"/>
-                  </a:solidFill>
-                </a:rPr>
-                <a:t>Why?</a:t>
-              </a:r>
-            </a:p>
-          </p:txBody>
-        </p:sp>
-        <p:sp>
-          <p:nvSpPr>
-            <p:cNvPr id="8" name="TextBox 7">
-              <a:extLst>
-                <a:ext uri="{FF2B5EF4-FFF2-40B4-BE49-F238E27FC236}">
-                  <a16:creationId xmlns:a16="http://schemas.microsoft.com/office/drawing/2014/main" id="{44657A2D-A10C-1745-AFDB-1C0FC5EA2AAD}"/>
-                </a:ext>
-              </a:extLst>
-            </p:cNvPr>
-            <p:cNvSpPr txBox="1"/>
-            <p:nvPr/>
-          </p:nvSpPr>
-          <p:spPr>
-            <a:xfrm>
-              <a:off x="1600201" y="4648200"/>
-              <a:ext cx="7429500" cy="954107"/>
-            </a:xfrm>
-            <a:prstGeom prst="rect">
-              <a:avLst/>
-            </a:prstGeom>
-            <a:noFill/>
-          </p:spPr>
-          <p:txBody>
-            <a:bodyPr wrap="square" rtlCol="0">
-              <a:spAutoFit/>
-            </a:bodyPr>
-            <a:lstStyle/>
-            <a:p>
-              <a:r>
-                <a:rPr lang="en-US" sz="2800" dirty="0"/>
-                <a:t>To prevent people from being “blinded by science” regarding textual criticism</a:t>
-              </a:r>
-            </a:p>
-          </p:txBody>
-        </p:sp>
-      </p:grpSp>
-      <p:grpSp>
-        <p:nvGrpSpPr>
-          <p:cNvPr id="9" name="Group 8">
-            <a:extLst>
-              <a:ext uri="{FF2B5EF4-FFF2-40B4-BE49-F238E27FC236}">
-                <a16:creationId xmlns:a16="http://schemas.microsoft.com/office/drawing/2014/main" id="{493A2E7B-FE2C-7045-B882-6D1EC3306C1D}"/>
-              </a:ext>
-            </a:extLst>
-          </p:cNvPr>
-          <p:cNvGrpSpPr/>
-          <p:nvPr/>
-        </p:nvGrpSpPr>
-        <p:grpSpPr>
-          <a:xfrm>
-            <a:off x="209549" y="3914507"/>
-            <a:ext cx="8934443" cy="1369606"/>
-            <a:chOff x="304800" y="4648200"/>
-            <a:chExt cx="8934443" cy="1369606"/>
-          </a:xfrm>
-        </p:grpSpPr>
-        <p:sp>
-          <p:nvSpPr>
-            <p:cNvPr id="10" name="TextBox 9">
-              <a:extLst>
-                <a:ext uri="{FF2B5EF4-FFF2-40B4-BE49-F238E27FC236}">
-                  <a16:creationId xmlns:a16="http://schemas.microsoft.com/office/drawing/2014/main" id="{DCC9CB31-E9E8-7549-8460-8E8840BD1585}"/>
-                </a:ext>
-              </a:extLst>
-            </p:cNvPr>
-            <p:cNvSpPr txBox="1"/>
-            <p:nvPr/>
-          </p:nvSpPr>
-          <p:spPr>
-            <a:xfrm>
-              <a:off x="304800" y="4648200"/>
-              <a:ext cx="1020023" cy="523220"/>
-            </a:xfrm>
-            <a:prstGeom prst="rect">
-              <a:avLst/>
-            </a:prstGeom>
-            <a:noFill/>
-          </p:spPr>
-          <p:txBody>
-            <a:bodyPr wrap="none" rtlCol="0">
-              <a:spAutoFit/>
-            </a:bodyPr>
-            <a:lstStyle/>
-            <a:p>
-              <a:r>
-                <a:rPr lang="en-US" sz="2800" dirty="0">
-                  <a:solidFill>
-                    <a:srgbClr val="009EC0"/>
-                  </a:solidFill>
-                </a:rPr>
-                <a:t>How?</a:t>
-              </a:r>
-            </a:p>
-          </p:txBody>
-        </p:sp>
-        <p:sp>
-          <p:nvSpPr>
-            <p:cNvPr id="11" name="TextBox 10">
-              <a:extLst>
-                <a:ext uri="{FF2B5EF4-FFF2-40B4-BE49-F238E27FC236}">
-                  <a16:creationId xmlns:a16="http://schemas.microsoft.com/office/drawing/2014/main" id="{4729ADED-FFF5-454C-BE17-6323C474D829}"/>
-                </a:ext>
-              </a:extLst>
-            </p:cNvPr>
-            <p:cNvSpPr txBox="1"/>
-            <p:nvPr/>
-          </p:nvSpPr>
-          <p:spPr>
-            <a:xfrm>
-              <a:off x="1600200" y="4648200"/>
-              <a:ext cx="7639043" cy="1369606"/>
-            </a:xfrm>
-            <a:prstGeom prst="rect">
-              <a:avLst/>
-            </a:prstGeom>
-            <a:noFill/>
-          </p:spPr>
-          <p:txBody>
-            <a:bodyPr wrap="square" rtlCol="0">
-              <a:spAutoFit/>
-            </a:bodyPr>
-            <a:lstStyle/>
-            <a:p>
-              <a:r>
-                <a:rPr lang="en-US" sz="2800" dirty="0"/>
-                <a:t>By showing that:</a:t>
-              </a:r>
-            </a:p>
-            <a:p>
-              <a:pPr marL="514350" indent="-514350">
-                <a:buFont typeface="+mj-lt"/>
-                <a:buAutoNum type="arabicPeriod"/>
-              </a:pPr>
-              <a:r>
-                <a:rPr lang="en-US" sz="2800" dirty="0"/>
-                <a:t>Variations in the text aren’t critical</a:t>
-              </a:r>
-            </a:p>
-            <a:p>
-              <a:pPr marL="514350" indent="-514350">
-                <a:buFont typeface="+mj-lt"/>
-                <a:buAutoNum type="arabicPeriod"/>
-              </a:pPr>
-              <a:r>
-                <a:rPr lang="en-US" sz="2700" dirty="0" err="1"/>
-                <a:t>Ehrman</a:t>
-              </a:r>
-              <a:r>
-                <a:rPr lang="en-US" sz="2700" dirty="0"/>
-                <a:t> overstates his claim (by quoting </a:t>
-              </a:r>
-              <a:r>
-                <a:rPr lang="en-US" sz="2700" dirty="0" err="1"/>
-                <a:t>Ehrman</a:t>
-              </a:r>
-              <a:r>
-                <a:rPr lang="en-US" sz="2700" dirty="0"/>
-                <a:t>)</a:t>
-              </a:r>
-            </a:p>
-          </p:txBody>
-        </p:sp>
-      </p:grpSp>
-      <p:cxnSp>
-        <p:nvCxnSpPr>
-          <p:cNvPr id="13" name="Straight Connector 12">
-            <a:extLst>
-              <a:ext uri="{FF2B5EF4-FFF2-40B4-BE49-F238E27FC236}">
-                <a16:creationId xmlns:a16="http://schemas.microsoft.com/office/drawing/2014/main" id="{09B462F9-C753-8044-8DE2-965ABC154D9C}"/>
-              </a:ext>
-            </a:extLst>
-          </p:cNvPr>
-          <p:cNvCxnSpPr>
-            <a:cxnSpLocks/>
-          </p:cNvCxnSpPr>
-          <p:nvPr/>
-        </p:nvCxnSpPr>
-        <p:spPr>
-          <a:xfrm>
-            <a:off x="1373874" y="1669464"/>
-            <a:ext cx="0" cy="4197936"/>
-          </a:xfrm>
-          <a:prstGeom prst="line">
-            <a:avLst/>
-          </a:prstGeom>
-          <a:ln>
-            <a:solidFill>
-              <a:schemeClr val="bg1">
-                <a:lumMod val="75000"/>
-                <a:lumOff val="25000"/>
-              </a:schemeClr>
-            </a:solidFill>
-          </a:ln>
-        </p:spPr>
-        <p:style>
-          <a:lnRef idx="1">
-            <a:schemeClr val="accent1"/>
-          </a:lnRef>
-          <a:fillRef idx="0">
-            <a:schemeClr val="accent1"/>
-          </a:fillRef>
-          <a:effectRef idx="0">
-            <a:schemeClr val="accent1"/>
-          </a:effectRef>
-          <a:fontRef idx="minor">
-            <a:schemeClr val="tx1"/>
-          </a:fontRef>
-        </p:style>
-      </p:cxnSp>
-      <p:sp>
-        <p:nvSpPr>
-          <p:cNvPr id="15" name="TextBox 14">
-            <a:extLst>
-              <a:ext uri="{FF2B5EF4-FFF2-40B4-BE49-F238E27FC236}">
-                <a16:creationId xmlns:a16="http://schemas.microsoft.com/office/drawing/2014/main" id="{C43D1156-26DE-A44F-B5F8-AACFA794E957}"/>
-              </a:ext>
-            </a:extLst>
-          </p:cNvPr>
-          <p:cNvSpPr txBox="1"/>
-          <p:nvPr/>
-        </p:nvSpPr>
-        <p:spPr>
-          <a:xfrm>
-            <a:off x="209549" y="708674"/>
-            <a:ext cx="8934451" cy="769441"/>
-          </a:xfrm>
-          <a:prstGeom prst="rect">
-            <a:avLst/>
-          </a:prstGeom>
-          <a:noFill/>
-        </p:spPr>
-        <p:txBody>
-          <a:bodyPr wrap="square" rtlCol="0">
-            <a:spAutoFit/>
-          </a:bodyPr>
-          <a:lstStyle/>
-          <a:p>
-            <a:r>
-              <a:rPr lang="en-US" sz="4400" b="1" dirty="0"/>
-              <a:t>IDEA IN BRIEF</a:t>
-            </a:r>
-          </a:p>
-        </p:txBody>
-      </p:sp>
-    </p:spTree>
-    <p:extLst>
-      <p:ext uri="{BB962C8B-B14F-4D97-AF65-F5344CB8AC3E}">
-        <p14:creationId xmlns:p14="http://schemas.microsoft.com/office/powerpoint/2010/main" val="1427530079"/>
-      </p:ext>
-    </p:extLst>
-  </p:cSld>
-  <p:clrMapOvr>
-    <a:masterClrMapping/>
-  </p:clrMapOvr>
-  <p:timing>
-    <p:tnLst>
-      <p:par>
-        <p:cTn id="1" dur="indefinite" restart="never" nodeType="tmRoot">
-          <p:childTnLst>
-            <p:seq concurrent="1" nextAc="seek">
-              <p:cTn id="2" dur="indefinite" nodeType="mainSeq">
-                <p:childTnLst>
-                  <p:par>
-                    <p:cTn id="3" fill="hold">
-                      <p:stCondLst>
-                        <p:cond delay="indefinite"/>
-                      </p:stCondLst>
-                      <p:childTnLst>
-                        <p:par>
-                          <p:cTn id="4" fill="hold">
-                            <p:stCondLst>
-                              <p:cond delay="0"/>
-                            </p:stCondLst>
-                            <p:childTnLst>
-                              <p:par>
-                                <p:cTn id="5" presetID="10" presetClass="entr" presetSubtype="0" fill="hold" grpId="0" nodeType="clickEffect">
-                                  <p:stCondLst>
-                                    <p:cond delay="0"/>
-                                  </p:stCondLst>
-                                  <p:childTnLst>
-                                    <p:set>
-                                      <p:cBhvr>
-                                        <p:cTn id="6" dur="1" fill="hold">
-                                          <p:stCondLst>
-                                            <p:cond delay="0"/>
-                                          </p:stCondLst>
-                                        </p:cTn>
-                                        <p:tgtEl>
-                                          <p:spTgt spid="15"/>
-                                        </p:tgtEl>
-                                        <p:attrNameLst>
-                                          <p:attrName>style.visibility</p:attrName>
-                                        </p:attrNameLst>
-                                      </p:cBhvr>
-                                      <p:to>
-                                        <p:strVal val="visible"/>
-                                      </p:to>
-                                    </p:set>
-                                    <p:animEffect transition="in" filter="fade">
-                                      <p:cBhvr>
-                                        <p:cTn id="7" dur="250"/>
-                                        <p:tgtEl>
-                                          <p:spTgt spid="15"/>
-                                        </p:tgtEl>
-                                      </p:cBhvr>
-                                    </p:animEffect>
-                                  </p:childTnLst>
-                                </p:cTn>
-                              </p:par>
-                            </p:childTnLst>
-                          </p:cTn>
-                        </p:par>
-                      </p:childTnLst>
-                    </p:cTn>
-                  </p:par>
-                  <p:par>
-                    <p:cTn id="8" fill="hold">
-                      <p:stCondLst>
-                        <p:cond delay="indefinite"/>
-                      </p:stCondLst>
-                      <p:childTnLst>
-                        <p:par>
-                          <p:cTn id="9" fill="hold">
-                            <p:stCondLst>
-                              <p:cond delay="0"/>
-                            </p:stCondLst>
-                            <p:childTnLst>
-                              <p:par>
-                                <p:cTn id="10" presetID="10" presetClass="entr" presetSubtype="0" fill="hold" nodeType="clickEffect">
-                                  <p:stCondLst>
-                                    <p:cond delay="0"/>
-                                  </p:stCondLst>
-                                  <p:childTnLst>
-                                    <p:set>
-                                      <p:cBhvr>
-                                        <p:cTn id="11" dur="1" fill="hold">
-                                          <p:stCondLst>
-                                            <p:cond delay="0"/>
-                                          </p:stCondLst>
-                                        </p:cTn>
-                                        <p:tgtEl>
-                                          <p:spTgt spid="13"/>
-                                        </p:tgtEl>
-                                        <p:attrNameLst>
-                                          <p:attrName>style.visibility</p:attrName>
-                                        </p:attrNameLst>
-                                      </p:cBhvr>
-                                      <p:to>
-                                        <p:strVal val="visible"/>
-                                      </p:to>
-                                    </p:set>
-                                    <p:animEffect transition="in" filter="fade">
-                                      <p:cBhvr>
-                                        <p:cTn id="12" dur="250"/>
-                                        <p:tgtEl>
-                                          <p:spTgt spid="13"/>
-                                        </p:tgtEl>
-                                      </p:cBhvr>
-                                    </p:animEffect>
-                                  </p:childTnLst>
-                                </p:cTn>
-                              </p:par>
-                            </p:childTnLst>
-                          </p:cTn>
-                        </p:par>
-                        <p:par>
-                          <p:cTn id="13" fill="hold">
-                            <p:stCondLst>
-                              <p:cond delay="250"/>
-                            </p:stCondLst>
-                            <p:childTnLst>
-                              <p:par>
-                                <p:cTn id="14" presetID="10" presetClass="entr" presetSubtype="0" fill="hold" nodeType="afterEffect">
-                                  <p:stCondLst>
-                                    <p:cond delay="0"/>
-                                  </p:stCondLst>
-                                  <p:childTnLst>
-                                    <p:set>
-                                      <p:cBhvr>
-                                        <p:cTn id="15" dur="1" fill="hold">
-                                          <p:stCondLst>
-                                            <p:cond delay="0"/>
-                                          </p:stCondLst>
-                                        </p:cTn>
-                                        <p:tgtEl>
-                                          <p:spTgt spid="4"/>
-                                        </p:tgtEl>
-                                        <p:attrNameLst>
-                                          <p:attrName>style.visibility</p:attrName>
-                                        </p:attrNameLst>
-                                      </p:cBhvr>
-                                      <p:to>
-                                        <p:strVal val="visible"/>
-                                      </p:to>
-                                    </p:set>
-                                    <p:animEffect transition="in" filter="fade">
-                                      <p:cBhvr>
-                                        <p:cTn id="16" dur="250"/>
-                                        <p:tgtEl>
-                                          <p:spTgt spid="4"/>
-                                        </p:tgtEl>
-                                      </p:cBhvr>
-                                    </p:animEffect>
-                                  </p:childTnLst>
-                                </p:cTn>
-                              </p:par>
-                            </p:childTnLst>
-                          </p:cTn>
-                        </p:par>
-                      </p:childTnLst>
-                    </p:cTn>
-                  </p:par>
-                  <p:par>
-                    <p:cTn id="17" fill="hold">
-                      <p:stCondLst>
-                        <p:cond delay="indefinite"/>
-                      </p:stCondLst>
-                      <p:childTnLst>
-                        <p:par>
-                          <p:cTn id="18" fill="hold">
-                            <p:stCondLst>
-                              <p:cond delay="0"/>
-                            </p:stCondLst>
-                            <p:childTnLst>
-                              <p:par>
-                                <p:cTn id="19" presetID="10" presetClass="entr" presetSubtype="0" fill="hold" nodeType="clickEffect">
-                                  <p:stCondLst>
-                                    <p:cond delay="0"/>
-                                  </p:stCondLst>
-                                  <p:childTnLst>
-                                    <p:set>
-                                      <p:cBhvr>
-                                        <p:cTn id="20" dur="1" fill="hold">
-                                          <p:stCondLst>
-                                            <p:cond delay="0"/>
-                                          </p:stCondLst>
-                                        </p:cTn>
-                                        <p:tgtEl>
-                                          <p:spTgt spid="6"/>
-                                        </p:tgtEl>
-                                        <p:attrNameLst>
-                                          <p:attrName>style.visibility</p:attrName>
-                                        </p:attrNameLst>
-                                      </p:cBhvr>
-                                      <p:to>
-                                        <p:strVal val="visible"/>
-                                      </p:to>
-                                    </p:set>
-                                    <p:animEffect transition="in" filter="fade">
-                                      <p:cBhvr>
-                                        <p:cTn id="21" dur="250"/>
-                                        <p:tgtEl>
-                                          <p:spTgt spid="6"/>
-                                        </p:tgtEl>
-                                      </p:cBhvr>
-                                    </p:animEffect>
-                                  </p:childTnLst>
-                                </p:cTn>
-                              </p:par>
-                            </p:childTnLst>
-                          </p:cTn>
-                        </p:par>
-                      </p:childTnLst>
-                    </p:cTn>
-                  </p:par>
-                  <p:par>
-                    <p:cTn id="22" fill="hold">
-                      <p:stCondLst>
-                        <p:cond delay="indefinite"/>
-                      </p:stCondLst>
-                      <p:childTnLst>
-                        <p:par>
-                          <p:cTn id="23" fill="hold">
-                            <p:stCondLst>
-                              <p:cond delay="0"/>
-                            </p:stCondLst>
-                            <p:childTnLst>
-                              <p:par>
-                                <p:cTn id="24" presetID="10" presetClass="entr" presetSubtype="0" fill="hold" nodeType="clickEffect">
-                                  <p:stCondLst>
-                                    <p:cond delay="0"/>
-                                  </p:stCondLst>
-                                  <p:childTnLst>
-                                    <p:set>
-                                      <p:cBhvr>
-                                        <p:cTn id="25" dur="1" fill="hold">
-                                          <p:stCondLst>
-                                            <p:cond delay="0"/>
-                                          </p:stCondLst>
-                                        </p:cTn>
-                                        <p:tgtEl>
-                                          <p:spTgt spid="9"/>
-                                        </p:tgtEl>
-                                        <p:attrNameLst>
-                                          <p:attrName>style.visibility</p:attrName>
-                                        </p:attrNameLst>
-                                      </p:cBhvr>
-                                      <p:to>
-                                        <p:strVal val="visible"/>
-                                      </p:to>
-                                    </p:set>
-                                    <p:animEffect transition="in" filter="fade">
-                                      <p:cBhvr>
-                                        <p:cTn id="26" dur="250"/>
-                                        <p:tgtEl>
-                                          <p:spTgt spid="9"/>
-                                        </p:tgtEl>
-                                      </p:cBhvr>
-                                    </p:animEffect>
-                                  </p:childTnLst>
-                                </p:cTn>
-                              </p:par>
-                            </p:childTnLst>
-                          </p:cTn>
-                        </p:par>
-                      </p:childTnLst>
-                    </p:cTn>
-                  </p:par>
-                </p:childTnLst>
-              </p:cTn>
-              <p:prevCondLst>
-                <p:cond evt="onPrev" delay="0">
-                  <p:tgtEl>
-                    <p:sldTgt/>
-                  </p:tgtEl>
-                </p:cond>
-              </p:prevCondLst>
-              <p:nextCondLst>
-                <p:cond evt="onNext" delay="0">
-                  <p:tgtEl>
-                    <p:sldTgt/>
-                  </p:tgtEl>
-                </p:cond>
-              </p:nextCondLst>
-            </p:seq>
-          </p:childTnLst>
-        </p:cTn>
-      </p:par>
-    </p:tnLst>
-    <p:bldLst>
-      <p:bldP spid="15" grpId="0"/>
-    </p:bldLst>
-  </p:timing>
-</p:sld>
-</file>
-
-<file path=ppt/slides/slide40.xml><?xml version="1.0" encoding="utf-8"?>
+<file path=ppt/slides/slide39.xml><?xml version="1.0" encoding="utf-8"?>
 <p:sld xmlns:a="http://schemas.openxmlformats.org/drawingml/2006/main" xmlns:r="http://schemas.openxmlformats.org/officeDocument/2006/relationships" xmlns:p="http://schemas.openxmlformats.org/presentationml/2006/main">
   <p:cSld>
     <p:spTree>
@@ -35491,6 +34141,728 @@
 </p:sld>
 </file>
 
+<file path=ppt/slides/slide4.xml><?xml version="1.0" encoding="utf-8"?>
+<p:sld xmlns:a="http://schemas.openxmlformats.org/drawingml/2006/main" xmlns:r="http://schemas.openxmlformats.org/officeDocument/2006/relationships" xmlns:p="http://schemas.openxmlformats.org/presentationml/2006/main">
+  <p:cSld>
+    <p:spTree>
+      <p:nvGrpSpPr>
+        <p:cNvPr id="1" name=""/>
+        <p:cNvGrpSpPr/>
+        <p:nvPr/>
+      </p:nvGrpSpPr>
+      <p:grpSpPr>
+        <a:xfrm>
+          <a:off x="0" y="0"/>
+          <a:ext cx="0" cy="0"/>
+          <a:chOff x="0" y="0"/>
+          <a:chExt cx="0" cy="0"/>
+        </a:xfrm>
+      </p:grpSpPr>
+      <p:grpSp>
+        <p:nvGrpSpPr>
+          <p:cNvPr id="4" name="Group 3">
+            <a:extLst>
+              <a:ext uri="{FF2B5EF4-FFF2-40B4-BE49-F238E27FC236}">
+                <a16:creationId xmlns:a16="http://schemas.microsoft.com/office/drawing/2014/main" id="{76D0AD62-610F-2343-9B0E-52F648458EA8}"/>
+              </a:ext>
+            </a:extLst>
+          </p:cNvPr>
+          <p:cNvGrpSpPr/>
+          <p:nvPr/>
+        </p:nvGrpSpPr>
+        <p:grpSpPr>
+          <a:xfrm>
+            <a:off x="209549" y="1669464"/>
+            <a:ext cx="8724901" cy="954107"/>
+            <a:chOff x="304800" y="4648200"/>
+            <a:chExt cx="8724901" cy="954107"/>
+          </a:xfrm>
+        </p:grpSpPr>
+        <p:sp>
+          <p:nvSpPr>
+            <p:cNvPr id="2" name="TextBox 1">
+              <a:extLst>
+                <a:ext uri="{FF2B5EF4-FFF2-40B4-BE49-F238E27FC236}">
+                  <a16:creationId xmlns:a16="http://schemas.microsoft.com/office/drawing/2014/main" id="{65E69FF4-5D6C-1F4A-BC1D-8328E1004154}"/>
+                </a:ext>
+              </a:extLst>
+            </p:cNvPr>
+            <p:cNvSpPr txBox="1"/>
+            <p:nvPr/>
+          </p:nvSpPr>
+          <p:spPr>
+            <a:xfrm>
+              <a:off x="304800" y="4648200"/>
+              <a:ext cx="1147943" cy="523220"/>
+            </a:xfrm>
+            <a:prstGeom prst="rect">
+              <a:avLst/>
+            </a:prstGeom>
+            <a:noFill/>
+          </p:spPr>
+          <p:txBody>
+            <a:bodyPr wrap="none" rtlCol="0">
+              <a:spAutoFit/>
+            </a:bodyPr>
+            <a:lstStyle/>
+            <a:p>
+              <a:r>
+                <a:rPr lang="en-US" sz="2800" dirty="0">
+                  <a:solidFill>
+                    <a:srgbClr val="009EC0"/>
+                  </a:solidFill>
+                </a:rPr>
+                <a:t>What?</a:t>
+              </a:r>
+            </a:p>
+          </p:txBody>
+        </p:sp>
+        <p:sp>
+          <p:nvSpPr>
+            <p:cNvPr id="3" name="TextBox 2">
+              <a:extLst>
+                <a:ext uri="{FF2B5EF4-FFF2-40B4-BE49-F238E27FC236}">
+                  <a16:creationId xmlns:a16="http://schemas.microsoft.com/office/drawing/2014/main" id="{E796A5EC-87C6-D048-8010-771FD1CA8E24}"/>
+                </a:ext>
+              </a:extLst>
+            </p:cNvPr>
+            <p:cNvSpPr txBox="1"/>
+            <p:nvPr/>
+          </p:nvSpPr>
+          <p:spPr>
+            <a:xfrm>
+              <a:off x="1600201" y="4648200"/>
+              <a:ext cx="7429500" cy="954107"/>
+            </a:xfrm>
+            <a:prstGeom prst="rect">
+              <a:avLst/>
+            </a:prstGeom>
+            <a:noFill/>
+          </p:spPr>
+          <p:txBody>
+            <a:bodyPr wrap="square" rtlCol="0">
+              <a:spAutoFit/>
+            </a:bodyPr>
+            <a:lstStyle/>
+            <a:p>
+              <a:r>
+                <a:rPr lang="en-US" sz="2800" dirty="0"/>
+                <a:t>Know how we can determine what the original accounts said despite not having the originals</a:t>
+              </a:r>
+            </a:p>
+          </p:txBody>
+        </p:sp>
+      </p:grpSp>
+      <p:grpSp>
+        <p:nvGrpSpPr>
+          <p:cNvPr id="6" name="Group 5">
+            <a:extLst>
+              <a:ext uri="{FF2B5EF4-FFF2-40B4-BE49-F238E27FC236}">
+                <a16:creationId xmlns:a16="http://schemas.microsoft.com/office/drawing/2014/main" id="{16DEED69-411E-5C47-8C2F-1FA7F3AC4BAB}"/>
+              </a:ext>
+            </a:extLst>
+          </p:cNvPr>
+          <p:cNvGrpSpPr/>
+          <p:nvPr/>
+        </p:nvGrpSpPr>
+        <p:grpSpPr>
+          <a:xfrm>
+            <a:off x="209549" y="2779693"/>
+            <a:ext cx="8724901" cy="954107"/>
+            <a:chOff x="304800" y="4648200"/>
+            <a:chExt cx="8724901" cy="954107"/>
+          </a:xfrm>
+        </p:grpSpPr>
+        <p:sp>
+          <p:nvSpPr>
+            <p:cNvPr id="7" name="TextBox 6">
+              <a:extLst>
+                <a:ext uri="{FF2B5EF4-FFF2-40B4-BE49-F238E27FC236}">
+                  <a16:creationId xmlns:a16="http://schemas.microsoft.com/office/drawing/2014/main" id="{0BE67C1E-EE53-F64B-A1C4-C71C7BD5283F}"/>
+                </a:ext>
+              </a:extLst>
+            </p:cNvPr>
+            <p:cNvSpPr txBox="1"/>
+            <p:nvPr/>
+          </p:nvSpPr>
+          <p:spPr>
+            <a:xfrm>
+              <a:off x="304800" y="4648200"/>
+              <a:ext cx="1014765" cy="523220"/>
+            </a:xfrm>
+            <a:prstGeom prst="rect">
+              <a:avLst/>
+            </a:prstGeom>
+            <a:noFill/>
+          </p:spPr>
+          <p:txBody>
+            <a:bodyPr wrap="none" rtlCol="0">
+              <a:spAutoFit/>
+            </a:bodyPr>
+            <a:lstStyle/>
+            <a:p>
+              <a:r>
+                <a:rPr lang="en-US" sz="2800" dirty="0">
+                  <a:solidFill>
+                    <a:srgbClr val="009EC0"/>
+                  </a:solidFill>
+                </a:rPr>
+                <a:t>Why?</a:t>
+              </a:r>
+            </a:p>
+          </p:txBody>
+        </p:sp>
+        <p:sp>
+          <p:nvSpPr>
+            <p:cNvPr id="8" name="TextBox 7">
+              <a:extLst>
+                <a:ext uri="{FF2B5EF4-FFF2-40B4-BE49-F238E27FC236}">
+                  <a16:creationId xmlns:a16="http://schemas.microsoft.com/office/drawing/2014/main" id="{44657A2D-A10C-1745-AFDB-1C0FC5EA2AAD}"/>
+                </a:ext>
+              </a:extLst>
+            </p:cNvPr>
+            <p:cNvSpPr txBox="1"/>
+            <p:nvPr/>
+          </p:nvSpPr>
+          <p:spPr>
+            <a:xfrm>
+              <a:off x="1600201" y="4648200"/>
+              <a:ext cx="7429500" cy="954107"/>
+            </a:xfrm>
+            <a:prstGeom prst="rect">
+              <a:avLst/>
+            </a:prstGeom>
+            <a:noFill/>
+          </p:spPr>
+          <p:txBody>
+            <a:bodyPr wrap="square" rtlCol="0">
+              <a:spAutoFit/>
+            </a:bodyPr>
+            <a:lstStyle/>
+            <a:p>
+              <a:r>
+                <a:rPr lang="en-US" sz="2800" dirty="0"/>
+                <a:t>To prevent people from being “blinded by science” </a:t>
+              </a:r>
+              <a:r>
+                <a:rPr lang="en-US" sz="2800"/>
+                <a:t>regarding scribal errors</a:t>
+              </a:r>
+              <a:endParaRPr lang="en-US" sz="2800" dirty="0"/>
+            </a:p>
+          </p:txBody>
+        </p:sp>
+      </p:grpSp>
+      <p:grpSp>
+        <p:nvGrpSpPr>
+          <p:cNvPr id="9" name="Group 8">
+            <a:extLst>
+              <a:ext uri="{FF2B5EF4-FFF2-40B4-BE49-F238E27FC236}">
+                <a16:creationId xmlns:a16="http://schemas.microsoft.com/office/drawing/2014/main" id="{493A2E7B-FE2C-7045-B882-6D1EC3306C1D}"/>
+              </a:ext>
+            </a:extLst>
+          </p:cNvPr>
+          <p:cNvGrpSpPr/>
+          <p:nvPr/>
+        </p:nvGrpSpPr>
+        <p:grpSpPr>
+          <a:xfrm>
+            <a:off x="209549" y="3914507"/>
+            <a:ext cx="8934443" cy="1369606"/>
+            <a:chOff x="304800" y="4648200"/>
+            <a:chExt cx="8934443" cy="1369606"/>
+          </a:xfrm>
+        </p:grpSpPr>
+        <p:sp>
+          <p:nvSpPr>
+            <p:cNvPr id="10" name="TextBox 9">
+              <a:extLst>
+                <a:ext uri="{FF2B5EF4-FFF2-40B4-BE49-F238E27FC236}">
+                  <a16:creationId xmlns:a16="http://schemas.microsoft.com/office/drawing/2014/main" id="{DCC9CB31-E9E8-7549-8460-8E8840BD1585}"/>
+                </a:ext>
+              </a:extLst>
+            </p:cNvPr>
+            <p:cNvSpPr txBox="1"/>
+            <p:nvPr/>
+          </p:nvSpPr>
+          <p:spPr>
+            <a:xfrm>
+              <a:off x="304800" y="4648200"/>
+              <a:ext cx="1020023" cy="523220"/>
+            </a:xfrm>
+            <a:prstGeom prst="rect">
+              <a:avLst/>
+            </a:prstGeom>
+            <a:noFill/>
+          </p:spPr>
+          <p:txBody>
+            <a:bodyPr wrap="none" rtlCol="0">
+              <a:spAutoFit/>
+            </a:bodyPr>
+            <a:lstStyle/>
+            <a:p>
+              <a:r>
+                <a:rPr lang="en-US" sz="2800" dirty="0">
+                  <a:solidFill>
+                    <a:srgbClr val="009EC0"/>
+                  </a:solidFill>
+                </a:rPr>
+                <a:t>How?</a:t>
+              </a:r>
+            </a:p>
+          </p:txBody>
+        </p:sp>
+        <p:sp>
+          <p:nvSpPr>
+            <p:cNvPr id="11" name="TextBox 10">
+              <a:extLst>
+                <a:ext uri="{FF2B5EF4-FFF2-40B4-BE49-F238E27FC236}">
+                  <a16:creationId xmlns:a16="http://schemas.microsoft.com/office/drawing/2014/main" id="{4729ADED-FFF5-454C-BE17-6323C474D829}"/>
+                </a:ext>
+              </a:extLst>
+            </p:cNvPr>
+            <p:cNvSpPr txBox="1"/>
+            <p:nvPr/>
+          </p:nvSpPr>
+          <p:spPr>
+            <a:xfrm>
+              <a:off x="1600200" y="4648200"/>
+              <a:ext cx="7639043" cy="1369606"/>
+            </a:xfrm>
+            <a:prstGeom prst="rect">
+              <a:avLst/>
+            </a:prstGeom>
+            <a:noFill/>
+          </p:spPr>
+          <p:txBody>
+            <a:bodyPr wrap="square" rtlCol="0">
+              <a:spAutoFit/>
+            </a:bodyPr>
+            <a:lstStyle/>
+            <a:p>
+              <a:r>
+                <a:rPr lang="en-US" sz="2800" dirty="0"/>
+                <a:t>By showing that:</a:t>
+              </a:r>
+            </a:p>
+            <a:p>
+              <a:pPr marL="514350" indent="-514350">
+                <a:buFont typeface="+mj-lt"/>
+                <a:buAutoNum type="arabicPeriod"/>
+              </a:pPr>
+              <a:r>
+                <a:rPr lang="en-US" sz="2800" dirty="0"/>
+                <a:t>Variations in the text aren’t critical</a:t>
+              </a:r>
+            </a:p>
+            <a:p>
+              <a:pPr marL="514350" indent="-514350">
+                <a:buFont typeface="+mj-lt"/>
+                <a:buAutoNum type="arabicPeriod"/>
+              </a:pPr>
+              <a:r>
+                <a:rPr lang="en-US" sz="2700" dirty="0" err="1"/>
+                <a:t>Ehrman</a:t>
+              </a:r>
+              <a:r>
+                <a:rPr lang="en-US" sz="2700" dirty="0"/>
+                <a:t> overstates his claim (by quoting </a:t>
+              </a:r>
+              <a:r>
+                <a:rPr lang="en-US" sz="2700" dirty="0" err="1"/>
+                <a:t>Ehrman</a:t>
+              </a:r>
+              <a:r>
+                <a:rPr lang="en-US" sz="2700" dirty="0"/>
+                <a:t>)</a:t>
+              </a:r>
+            </a:p>
+          </p:txBody>
+        </p:sp>
+      </p:grpSp>
+      <p:cxnSp>
+        <p:nvCxnSpPr>
+          <p:cNvPr id="13" name="Straight Connector 12">
+            <a:extLst>
+              <a:ext uri="{FF2B5EF4-FFF2-40B4-BE49-F238E27FC236}">
+                <a16:creationId xmlns:a16="http://schemas.microsoft.com/office/drawing/2014/main" id="{09B462F9-C753-8044-8DE2-965ABC154D9C}"/>
+              </a:ext>
+            </a:extLst>
+          </p:cNvPr>
+          <p:cNvCxnSpPr>
+            <a:cxnSpLocks/>
+          </p:cNvCxnSpPr>
+          <p:nvPr/>
+        </p:nvCxnSpPr>
+        <p:spPr>
+          <a:xfrm>
+            <a:off x="1373874" y="1669464"/>
+            <a:ext cx="0" cy="4197936"/>
+          </a:xfrm>
+          <a:prstGeom prst="line">
+            <a:avLst/>
+          </a:prstGeom>
+          <a:ln>
+            <a:solidFill>
+              <a:schemeClr val="bg1">
+                <a:lumMod val="75000"/>
+                <a:lumOff val="25000"/>
+              </a:schemeClr>
+            </a:solidFill>
+          </a:ln>
+        </p:spPr>
+        <p:style>
+          <a:lnRef idx="1">
+            <a:schemeClr val="accent1"/>
+          </a:lnRef>
+          <a:fillRef idx="0">
+            <a:schemeClr val="accent1"/>
+          </a:fillRef>
+          <a:effectRef idx="0">
+            <a:schemeClr val="accent1"/>
+          </a:effectRef>
+          <a:fontRef idx="minor">
+            <a:schemeClr val="tx1"/>
+          </a:fontRef>
+        </p:style>
+      </p:cxnSp>
+      <p:sp>
+        <p:nvSpPr>
+          <p:cNvPr id="15" name="TextBox 14">
+            <a:extLst>
+              <a:ext uri="{FF2B5EF4-FFF2-40B4-BE49-F238E27FC236}">
+                <a16:creationId xmlns:a16="http://schemas.microsoft.com/office/drawing/2014/main" id="{C43D1156-26DE-A44F-B5F8-AACFA794E957}"/>
+              </a:ext>
+            </a:extLst>
+          </p:cNvPr>
+          <p:cNvSpPr txBox="1"/>
+          <p:nvPr/>
+        </p:nvSpPr>
+        <p:spPr>
+          <a:xfrm>
+            <a:off x="209549" y="708674"/>
+            <a:ext cx="8934451" cy="769441"/>
+          </a:xfrm>
+          <a:prstGeom prst="rect">
+            <a:avLst/>
+          </a:prstGeom>
+          <a:noFill/>
+        </p:spPr>
+        <p:txBody>
+          <a:bodyPr wrap="square" rtlCol="0">
+            <a:spAutoFit/>
+          </a:bodyPr>
+          <a:lstStyle/>
+          <a:p>
+            <a:r>
+              <a:rPr lang="en-US" sz="4400" b="1" dirty="0"/>
+              <a:t>IDEA IN BRIEF</a:t>
+            </a:r>
+          </a:p>
+        </p:txBody>
+      </p:sp>
+    </p:spTree>
+    <p:extLst>
+      <p:ext uri="{BB962C8B-B14F-4D97-AF65-F5344CB8AC3E}">
+        <p14:creationId xmlns:p14="http://schemas.microsoft.com/office/powerpoint/2010/main" val="1427530079"/>
+      </p:ext>
+    </p:extLst>
+  </p:cSld>
+  <p:clrMapOvr>
+    <a:masterClrMapping/>
+  </p:clrMapOvr>
+  <p:timing>
+    <p:tnLst>
+      <p:par>
+        <p:cTn id="1" dur="indefinite" restart="never" nodeType="tmRoot">
+          <p:childTnLst>
+            <p:seq concurrent="1" nextAc="seek">
+              <p:cTn id="2" dur="indefinite" nodeType="mainSeq">
+                <p:childTnLst>
+                  <p:par>
+                    <p:cTn id="3" fill="hold">
+                      <p:stCondLst>
+                        <p:cond delay="indefinite"/>
+                      </p:stCondLst>
+                      <p:childTnLst>
+                        <p:par>
+                          <p:cTn id="4" fill="hold">
+                            <p:stCondLst>
+                              <p:cond delay="0"/>
+                            </p:stCondLst>
+                            <p:childTnLst>
+                              <p:par>
+                                <p:cTn id="5" presetID="10" presetClass="entr" presetSubtype="0" fill="hold" grpId="0" nodeType="clickEffect">
+                                  <p:stCondLst>
+                                    <p:cond delay="0"/>
+                                  </p:stCondLst>
+                                  <p:childTnLst>
+                                    <p:set>
+                                      <p:cBhvr>
+                                        <p:cTn id="6" dur="1" fill="hold">
+                                          <p:stCondLst>
+                                            <p:cond delay="0"/>
+                                          </p:stCondLst>
+                                        </p:cTn>
+                                        <p:tgtEl>
+                                          <p:spTgt spid="15"/>
+                                        </p:tgtEl>
+                                        <p:attrNameLst>
+                                          <p:attrName>style.visibility</p:attrName>
+                                        </p:attrNameLst>
+                                      </p:cBhvr>
+                                      <p:to>
+                                        <p:strVal val="visible"/>
+                                      </p:to>
+                                    </p:set>
+                                    <p:animEffect transition="in" filter="fade">
+                                      <p:cBhvr>
+                                        <p:cTn id="7" dur="250"/>
+                                        <p:tgtEl>
+                                          <p:spTgt spid="15"/>
+                                        </p:tgtEl>
+                                      </p:cBhvr>
+                                    </p:animEffect>
+                                  </p:childTnLst>
+                                </p:cTn>
+                              </p:par>
+                            </p:childTnLst>
+                          </p:cTn>
+                        </p:par>
+                      </p:childTnLst>
+                    </p:cTn>
+                  </p:par>
+                  <p:par>
+                    <p:cTn id="8" fill="hold">
+                      <p:stCondLst>
+                        <p:cond delay="indefinite"/>
+                      </p:stCondLst>
+                      <p:childTnLst>
+                        <p:par>
+                          <p:cTn id="9" fill="hold">
+                            <p:stCondLst>
+                              <p:cond delay="0"/>
+                            </p:stCondLst>
+                            <p:childTnLst>
+                              <p:par>
+                                <p:cTn id="10" presetID="10" presetClass="entr" presetSubtype="0" fill="hold" nodeType="clickEffect">
+                                  <p:stCondLst>
+                                    <p:cond delay="0"/>
+                                  </p:stCondLst>
+                                  <p:childTnLst>
+                                    <p:set>
+                                      <p:cBhvr>
+                                        <p:cTn id="11" dur="1" fill="hold">
+                                          <p:stCondLst>
+                                            <p:cond delay="0"/>
+                                          </p:stCondLst>
+                                        </p:cTn>
+                                        <p:tgtEl>
+                                          <p:spTgt spid="13"/>
+                                        </p:tgtEl>
+                                        <p:attrNameLst>
+                                          <p:attrName>style.visibility</p:attrName>
+                                        </p:attrNameLst>
+                                      </p:cBhvr>
+                                      <p:to>
+                                        <p:strVal val="visible"/>
+                                      </p:to>
+                                    </p:set>
+                                    <p:animEffect transition="in" filter="fade">
+                                      <p:cBhvr>
+                                        <p:cTn id="12" dur="250"/>
+                                        <p:tgtEl>
+                                          <p:spTgt spid="13"/>
+                                        </p:tgtEl>
+                                      </p:cBhvr>
+                                    </p:animEffect>
+                                  </p:childTnLst>
+                                </p:cTn>
+                              </p:par>
+                            </p:childTnLst>
+                          </p:cTn>
+                        </p:par>
+                        <p:par>
+                          <p:cTn id="13" fill="hold">
+                            <p:stCondLst>
+                              <p:cond delay="250"/>
+                            </p:stCondLst>
+                            <p:childTnLst>
+                              <p:par>
+                                <p:cTn id="14" presetID="10" presetClass="entr" presetSubtype="0" fill="hold" nodeType="afterEffect">
+                                  <p:stCondLst>
+                                    <p:cond delay="0"/>
+                                  </p:stCondLst>
+                                  <p:childTnLst>
+                                    <p:set>
+                                      <p:cBhvr>
+                                        <p:cTn id="15" dur="1" fill="hold">
+                                          <p:stCondLst>
+                                            <p:cond delay="0"/>
+                                          </p:stCondLst>
+                                        </p:cTn>
+                                        <p:tgtEl>
+                                          <p:spTgt spid="4"/>
+                                        </p:tgtEl>
+                                        <p:attrNameLst>
+                                          <p:attrName>style.visibility</p:attrName>
+                                        </p:attrNameLst>
+                                      </p:cBhvr>
+                                      <p:to>
+                                        <p:strVal val="visible"/>
+                                      </p:to>
+                                    </p:set>
+                                    <p:animEffect transition="in" filter="fade">
+                                      <p:cBhvr>
+                                        <p:cTn id="16" dur="250"/>
+                                        <p:tgtEl>
+                                          <p:spTgt spid="4"/>
+                                        </p:tgtEl>
+                                      </p:cBhvr>
+                                    </p:animEffect>
+                                  </p:childTnLst>
+                                </p:cTn>
+                              </p:par>
+                            </p:childTnLst>
+                          </p:cTn>
+                        </p:par>
+                      </p:childTnLst>
+                    </p:cTn>
+                  </p:par>
+                  <p:par>
+                    <p:cTn id="17" fill="hold">
+                      <p:stCondLst>
+                        <p:cond delay="indefinite"/>
+                      </p:stCondLst>
+                      <p:childTnLst>
+                        <p:par>
+                          <p:cTn id="18" fill="hold">
+                            <p:stCondLst>
+                              <p:cond delay="0"/>
+                            </p:stCondLst>
+                            <p:childTnLst>
+                              <p:par>
+                                <p:cTn id="19" presetID="10" presetClass="entr" presetSubtype="0" fill="hold" nodeType="clickEffect">
+                                  <p:stCondLst>
+                                    <p:cond delay="0"/>
+                                  </p:stCondLst>
+                                  <p:childTnLst>
+                                    <p:set>
+                                      <p:cBhvr>
+                                        <p:cTn id="20" dur="1" fill="hold">
+                                          <p:stCondLst>
+                                            <p:cond delay="0"/>
+                                          </p:stCondLst>
+                                        </p:cTn>
+                                        <p:tgtEl>
+                                          <p:spTgt spid="6"/>
+                                        </p:tgtEl>
+                                        <p:attrNameLst>
+                                          <p:attrName>style.visibility</p:attrName>
+                                        </p:attrNameLst>
+                                      </p:cBhvr>
+                                      <p:to>
+                                        <p:strVal val="visible"/>
+                                      </p:to>
+                                    </p:set>
+                                    <p:animEffect transition="in" filter="fade">
+                                      <p:cBhvr>
+                                        <p:cTn id="21" dur="250"/>
+                                        <p:tgtEl>
+                                          <p:spTgt spid="6"/>
+                                        </p:tgtEl>
+                                      </p:cBhvr>
+                                    </p:animEffect>
+                                  </p:childTnLst>
+                                </p:cTn>
+                              </p:par>
+                            </p:childTnLst>
+                          </p:cTn>
+                        </p:par>
+                      </p:childTnLst>
+                    </p:cTn>
+                  </p:par>
+                  <p:par>
+                    <p:cTn id="22" fill="hold">
+                      <p:stCondLst>
+                        <p:cond delay="indefinite"/>
+                      </p:stCondLst>
+                      <p:childTnLst>
+                        <p:par>
+                          <p:cTn id="23" fill="hold">
+                            <p:stCondLst>
+                              <p:cond delay="0"/>
+                            </p:stCondLst>
+                            <p:childTnLst>
+                              <p:par>
+                                <p:cTn id="24" presetID="10" presetClass="entr" presetSubtype="0" fill="hold" nodeType="clickEffect">
+                                  <p:stCondLst>
+                                    <p:cond delay="0"/>
+                                  </p:stCondLst>
+                                  <p:childTnLst>
+                                    <p:set>
+                                      <p:cBhvr>
+                                        <p:cTn id="25" dur="1" fill="hold">
+                                          <p:stCondLst>
+                                            <p:cond delay="0"/>
+                                          </p:stCondLst>
+                                        </p:cTn>
+                                        <p:tgtEl>
+                                          <p:spTgt spid="9"/>
+                                        </p:tgtEl>
+                                        <p:attrNameLst>
+                                          <p:attrName>style.visibility</p:attrName>
+                                        </p:attrNameLst>
+                                      </p:cBhvr>
+                                      <p:to>
+                                        <p:strVal val="visible"/>
+                                      </p:to>
+                                    </p:set>
+                                    <p:animEffect transition="in" filter="fade">
+                                      <p:cBhvr>
+                                        <p:cTn id="26" dur="250"/>
+                                        <p:tgtEl>
+                                          <p:spTgt spid="9"/>
+                                        </p:tgtEl>
+                                      </p:cBhvr>
+                                    </p:animEffect>
+                                  </p:childTnLst>
+                                </p:cTn>
+                              </p:par>
+                            </p:childTnLst>
+                          </p:cTn>
+                        </p:par>
+                      </p:childTnLst>
+                    </p:cTn>
+                  </p:par>
+                </p:childTnLst>
+              </p:cTn>
+              <p:prevCondLst>
+                <p:cond evt="onPrev" delay="0">
+                  <p:tgtEl>
+                    <p:sldTgt/>
+                  </p:tgtEl>
+                </p:cond>
+              </p:prevCondLst>
+              <p:nextCondLst>
+                <p:cond evt="onNext" delay="0">
+                  <p:tgtEl>
+                    <p:sldTgt/>
+                  </p:tgtEl>
+                </p:cond>
+              </p:nextCondLst>
+            </p:seq>
+          </p:childTnLst>
+        </p:cTn>
+      </p:par>
+    </p:tnLst>
+    <p:bldLst>
+      <p:bldP spid="15" grpId="0"/>
+    </p:bldLst>
+  </p:timing>
+</p:sld>
+</file>
+
 <file path=ppt/slides/slide5.xml><?xml version="1.0" encoding="utf-8"?>
 <p:sld xmlns:a="http://schemas.openxmlformats.org/drawingml/2006/main" xmlns:r="http://schemas.openxmlformats.org/officeDocument/2006/relationships" xmlns:p="http://schemas.openxmlformats.org/presentationml/2006/main">
   <p:cSld>
@@ -35522,7 +34894,7 @@
         </p:nvSpPr>
         <p:spPr>
           <a:xfrm>
-            <a:off x="231852" y="295670"/>
+            <a:off x="231852" y="228600"/>
             <a:ext cx="7167108" cy="830997"/>
           </a:xfrm>
           <a:prstGeom prst="rect">
@@ -35747,7 +35119,7 @@
         <p:spPr>
           <a:xfrm>
             <a:off x="231852" y="5731333"/>
-            <a:ext cx="7025692" cy="830997"/>
+            <a:ext cx="7845348" cy="830997"/>
           </a:xfrm>
           <a:prstGeom prst="rect">
             <a:avLst/>
@@ -35797,8 +35169,8 @@
         </p:nvSpPr>
         <p:spPr>
           <a:xfrm>
-            <a:off x="8458200" y="295669"/>
-            <a:ext cx="469380" cy="830997"/>
+            <a:off x="7620001" y="228600"/>
+            <a:ext cx="1307580" cy="830997"/>
           </a:xfrm>
           <a:prstGeom prst="rect">
             <a:avLst/>
@@ -35811,6 +35183,7 @@
           </a:bodyPr>
           <a:lstStyle/>
           <a:p>
+            <a:pPr algn="r"/>
             <a:r>
               <a:rPr lang="en-US" sz="4800" b="1" dirty="0"/>
               <a:t>0</a:t>
@@ -35849,7 +35222,7 @@
             <a:pPr algn="r"/>
             <a:r>
               <a:rPr lang="en-US" sz="4800" b="1" dirty="0"/>
-              <a:t>+1 = 1</a:t>
+              <a:t>1</a:t>
             </a:r>
           </a:p>
         </p:txBody>
@@ -35885,7 +35258,7 @@
             <a:pPr algn="r"/>
             <a:r>
               <a:rPr lang="en-US" sz="4800" b="1" dirty="0"/>
-              <a:t>+2 = 3</a:t>
+              <a:t>2</a:t>
             </a:r>
           </a:p>
         </p:txBody>
@@ -35921,7 +35294,7 @@
             <a:pPr algn="r"/>
             <a:r>
               <a:rPr lang="en-US" sz="4800" b="1" dirty="0"/>
-              <a:t>+1 = 4</a:t>
+              <a:t>3</a:t>
             </a:r>
           </a:p>
         </p:txBody>
@@ -35957,7 +35330,7 @@
             <a:pPr algn="r"/>
             <a:r>
               <a:rPr lang="en-US" sz="4800" b="1" dirty="0"/>
-              <a:t>+1 = 5</a:t>
+              <a:t>4</a:t>
             </a:r>
           </a:p>
         </p:txBody>
@@ -35993,7 +35366,7 @@
             <a:pPr algn="r"/>
             <a:r>
               <a:rPr lang="en-US" sz="4800" b="1" dirty="0"/>
-              <a:t>+1 = 6</a:t>
+              <a:t>5</a:t>
             </a:r>
           </a:p>
         </p:txBody>

</xml_diff>